<commit_message>
Añadida mi parte de la presentación así como la introducción y la valoración final. A ver qué os parece. Cuando añadáis lo vuestro fijaos en como están hechas el resto de transparencias; no hace falta tocar la plantilla ni nada, solo añadir nuevas diapositivas a la presentación. Por cierto, subo también las imágenes que he añadido a la presentación.
git-svn-id: http://mastervj.fdi.ucm.es/svn/master/grupo3/trunk@1311 afcbbe0f-131b-4dd2-a684-3ccf32d4d6de
</commit_message>
<xml_diff>
--- a/Hitos/Presentacion hito 2.pptx
+++ b/Hitos/Presentacion hito 2.pptx
@@ -5,16 +5,25 @@
     <p:sldMasterId id="2147483648" r:id="rId1"/>
   </p:sldMasterIdLst>
   <p:notesMasterIdLst>
-    <p:notesMasterId r:id="rId9"/>
+    <p:notesMasterId r:id="rId18"/>
   </p:notesMasterIdLst>
   <p:sldIdLst>
     <p:sldId id="256" r:id="rId2"/>
-    <p:sldId id="260" r:id="rId3"/>
-    <p:sldId id="261" r:id="rId4"/>
+    <p:sldId id="269" r:id="rId3"/>
+    <p:sldId id="270" r:id="rId4"/>
     <p:sldId id="262" r:id="rId5"/>
-    <p:sldId id="265" r:id="rId6"/>
-    <p:sldId id="263" r:id="rId7"/>
-    <p:sldId id="264" r:id="rId8"/>
+    <p:sldId id="266" r:id="rId6"/>
+    <p:sldId id="267" r:id="rId7"/>
+    <p:sldId id="268" r:id="rId8"/>
+    <p:sldId id="278" r:id="rId9"/>
+    <p:sldId id="279" r:id="rId10"/>
+    <p:sldId id="271" r:id="rId11"/>
+    <p:sldId id="272" r:id="rId12"/>
+    <p:sldId id="273" r:id="rId13"/>
+    <p:sldId id="274" r:id="rId14"/>
+    <p:sldId id="275" r:id="rId15"/>
+    <p:sldId id="276" r:id="rId16"/>
+    <p:sldId id="277" r:id="rId17"/>
   </p:sldIdLst>
   <p:sldSz cx="9144000" cy="6858000" type="screen4x3"/>
   <p:notesSz cx="6858000" cy="9144000"/>
@@ -599,7 +608,7 @@
             <a:spLocks noGrp="1"/>
           </p:cNvSpPr>
           <p:nvPr>
-            <p:ph type="title" hasCustomPrompt="1"/>
+            <p:ph type="title"/>
           </p:nvPr>
         </p:nvSpPr>
         <p:spPr/>
@@ -611,10 +620,6 @@
             </a:lvl1pPr>
           </a:lstStyle>
           <a:p>
-            <a:r>
-              <a:rPr lang="es-ES" dirty="0" smtClean="0"/>
-              <a:t>Cambios</a:t>
-            </a:r>
             <a:endParaRPr lang="es-ES" dirty="0"/>
           </a:p>
         </p:txBody>
@@ -707,14 +712,14 @@
       </p:sp>
       <p:sp>
         <p:nvSpPr>
-          <p:cNvPr id="8" name="7 Rectángulo"/>
+          <p:cNvPr id="7" name="6 Rectángulo"/>
           <p:cNvSpPr/>
           <p:nvPr userDrawn="1"/>
         </p:nvSpPr>
         <p:spPr>
           <a:xfrm>
-            <a:off x="1726282" y="1071533"/>
-            <a:ext cx="659155" cy="400110"/>
+            <a:off x="1133092" y="1050866"/>
+            <a:ext cx="1755545" cy="400110"/>
           </a:xfrm>
           <a:prstGeom prst="rect">
             <a:avLst/>
@@ -729,7 +734,7 @@
           <a:p>
             <a:pPr algn="ctr"/>
             <a:r>
-              <a:rPr lang="es-ES_tradnl" sz="2000" b="0" cap="none" spc="0" dirty="0" smtClean="0">
+              <a:rPr lang="es-ES" sz="2000" b="0" cap="none" spc="0" dirty="0" smtClean="0">
                 <a:ln w="10541" cmpd="sng">
                   <a:solidFill>
                     <a:srgbClr val="C00000"/>
@@ -741,8 +746,35 @@
                 </a:solidFill>
                 <a:effectLst/>
               </a:rPr>
-              <a:t>Dani</a:t>
-            </a:r>
+              <a:t>1.</a:t>
+            </a:r>
+            <a:r>
+              <a:rPr lang="es-ES" sz="2000" b="0" cap="none" spc="0" baseline="0" dirty="0" smtClean="0">
+                <a:ln w="10541" cmpd="sng">
+                  <a:solidFill>
+                    <a:srgbClr val="C00000"/>
+                  </a:solidFill>
+                  <a:prstDash val="solid"/>
+                </a:ln>
+                <a:solidFill>
+                  <a:srgbClr val="C00000"/>
+                </a:solidFill>
+                <a:effectLst/>
+              </a:rPr>
+              <a:t> Introducción</a:t>
+            </a:r>
+            <a:endParaRPr lang="es-ES" sz="2000" b="0" cap="none" spc="0" dirty="0">
+              <a:ln w="10541" cmpd="sng">
+                <a:solidFill>
+                  <a:srgbClr val="C00000"/>
+                </a:solidFill>
+                <a:prstDash val="solid"/>
+              </a:ln>
+              <a:solidFill>
+                <a:srgbClr val="C00000"/>
+              </a:solidFill>
+              <a:effectLst/>
+            </a:endParaRPr>
           </a:p>
         </p:txBody>
       </p:sp>
@@ -756,6 +788,13 @@
   <p:clrMapOvr>
     <a:masterClrMapping/>
   </p:clrMapOvr>
+  <p:timing>
+    <p:tnLst>
+      <p:par>
+        <p:cTn id="1" dur="indefinite" restart="never" nodeType="tmRoot"/>
+      </p:par>
+    </p:tnLst>
+  </p:timing>
 </p:sldLayout>
 </file>
 
@@ -783,7 +822,7 @@
             <a:spLocks noGrp="1"/>
           </p:cNvSpPr>
           <p:nvPr>
-            <p:ph type="title" hasCustomPrompt="1"/>
+            <p:ph type="title"/>
           </p:nvPr>
         </p:nvSpPr>
         <p:spPr/>
@@ -791,10 +830,6 @@
           <a:bodyPr/>
           <a:lstStyle/>
           <a:p>
-            <a:r>
-              <a:rPr lang="es-ES" dirty="0" smtClean="0"/>
-              <a:t>Cambios</a:t>
-            </a:r>
             <a:endParaRPr lang="es-ES" dirty="0"/>
           </a:p>
         </p:txBody>
@@ -887,14 +922,14 @@
       </p:sp>
       <p:sp>
         <p:nvSpPr>
-          <p:cNvPr id="6" name="5 Rectángulo"/>
+          <p:cNvPr id="7" name="6 Rectángulo"/>
           <p:cNvSpPr/>
           <p:nvPr userDrawn="1"/>
         </p:nvSpPr>
         <p:spPr>
           <a:xfrm>
-            <a:off x="2699792" y="1071533"/>
-            <a:ext cx="1224136" cy="400110"/>
+            <a:off x="2888637" y="1050863"/>
+            <a:ext cx="1556278" cy="400110"/>
           </a:xfrm>
           <a:prstGeom prst="rect">
             <a:avLst/>
@@ -909,7 +944,7 @@
           <a:p>
             <a:pPr algn="ctr"/>
             <a:r>
-              <a:rPr lang="es-ES_tradnl" sz="2000" b="0" cap="none" spc="0" dirty="0" smtClean="0">
+              <a:rPr lang="es-ES" sz="2000" b="0" cap="none" spc="0" dirty="0" smtClean="0">
                 <a:ln w="10541" cmpd="sng">
                   <a:solidFill>
                     <a:srgbClr val="C00000"/>
@@ -921,7 +956,22 @@
                 </a:solidFill>
                 <a:effectLst/>
               </a:rPr>
-              <a:t>Isaac</a:t>
+              <a:t>2.</a:t>
+            </a:r>
+            <a:r>
+              <a:rPr lang="es-ES" sz="2000" b="0" cap="none" spc="0" baseline="0" dirty="0" smtClean="0">
+                <a:ln w="10541" cmpd="sng">
+                  <a:solidFill>
+                    <a:srgbClr val="C00000"/>
+                  </a:solidFill>
+                  <a:prstDash val="solid"/>
+                </a:ln>
+                <a:solidFill>
+                  <a:srgbClr val="C00000"/>
+                </a:solidFill>
+                <a:effectLst/>
+              </a:rPr>
+              <a:t> Desarrollo</a:t>
             </a:r>
             <a:endParaRPr lang="es-ES" sz="2000" b="0" cap="none" spc="0" dirty="0">
               <a:ln w="10541" cmpd="sng">
@@ -948,6 +998,13 @@
   <p:clrMapOvr>
     <a:masterClrMapping/>
   </p:clrMapOvr>
+  <p:timing>
+    <p:tnLst>
+      <p:par>
+        <p:cTn id="1" dur="indefinite" restart="never" nodeType="tmRoot"/>
+      </p:par>
+    </p:tnLst>
+  </p:timing>
 </p:sldLayout>
 </file>
 
@@ -975,7 +1032,7 @@
             <a:spLocks noGrp="1"/>
           </p:cNvSpPr>
           <p:nvPr>
-            <p:ph type="title" hasCustomPrompt="1"/>
+            <p:ph type="title"/>
           </p:nvPr>
         </p:nvSpPr>
         <p:spPr/>
@@ -983,10 +1040,6 @@
           <a:bodyPr/>
           <a:lstStyle/>
           <a:p>
-            <a:r>
-              <a:rPr lang="es-ES" dirty="0" smtClean="0"/>
-              <a:t>Cambios</a:t>
-            </a:r>
             <a:endParaRPr lang="es-ES" dirty="0"/>
           </a:p>
         </p:txBody>
@@ -1079,14 +1132,14 @@
       </p:sp>
       <p:sp>
         <p:nvSpPr>
-          <p:cNvPr id="6" name="5 Rectángulo"/>
-          <p:cNvSpPr/>
+          <p:cNvPr id="7" name="6 CuadroTexto"/>
+          <p:cNvSpPr txBox="1"/>
           <p:nvPr userDrawn="1"/>
         </p:nvSpPr>
         <p:spPr>
           <a:xfrm>
-            <a:off x="3717735" y="1081365"/>
-            <a:ext cx="1152129" cy="400110"/>
+            <a:off x="4444915" y="1050866"/>
+            <a:ext cx="2053828" cy="400110"/>
           </a:xfrm>
           <a:prstGeom prst="rect">
             <a:avLst/>
@@ -1094,14 +1147,14 @@
           <a:noFill/>
         </p:spPr>
         <p:txBody>
-          <a:bodyPr wrap="square" lIns="91440" tIns="45720" rIns="91440" bIns="45720">
+          <a:bodyPr wrap="square" rtlCol="0">
             <a:spAutoFit/>
           </a:bodyPr>
           <a:lstStyle/>
           <a:p>
             <a:pPr algn="ctr"/>
             <a:r>
-              <a:rPr lang="es-ES" sz="2000" b="0" cap="none" spc="0" dirty="0" smtClean="0">
+              <a:rPr lang="es-ES" sz="2000" b="0" cap="none" spc="0" baseline="0" dirty="0" smtClean="0">
                 <a:ln w="10541" cmpd="sng">
                   <a:solidFill>
                     <a:srgbClr val="C00000"/>
@@ -1113,19 +1166,12 @@
                 </a:solidFill>
                 <a:effectLst/>
               </a:rPr>
-              <a:t>Luis</a:t>
-            </a:r>
-            <a:endParaRPr lang="es-ES" sz="2000" b="0" cap="none" spc="0" dirty="0">
-              <a:ln w="10541" cmpd="sng">
-                <a:solidFill>
-                  <a:srgbClr val="C00000"/>
-                </a:solidFill>
-                <a:prstDash val="solid"/>
-              </a:ln>
+              <a:t>3. Valoración final</a:t>
+            </a:r>
+            <a:endParaRPr lang="es-ES" sz="2000" dirty="0">
               <a:solidFill>
                 <a:srgbClr val="C00000"/>
               </a:solidFill>
-              <a:effectLst/>
             </a:endParaRPr>
           </a:p>
         </p:txBody>
@@ -1140,6 +1186,13 @@
   <p:clrMapOvr>
     <a:masterClrMapping/>
   </p:clrMapOvr>
+  <p:timing>
+    <p:tnLst>
+      <p:par>
+        <p:cTn id="1" dur="indefinite" restart="never" nodeType="tmRoot"/>
+      </p:par>
+    </p:tnLst>
+  </p:timing>
 </p:sldLayout>
 </file>
 
@@ -1275,14 +1328,14 @@
       </p:sp>
       <p:sp>
         <p:nvSpPr>
-          <p:cNvPr id="6" name="5 Rectángulo"/>
+          <p:cNvPr id="7" name="6 Rectángulo"/>
           <p:cNvSpPr/>
           <p:nvPr userDrawn="1"/>
         </p:nvSpPr>
         <p:spPr>
           <a:xfrm>
-            <a:off x="4644009" y="1071530"/>
-            <a:ext cx="2160240" cy="400110"/>
+            <a:off x="6498743" y="1050866"/>
+            <a:ext cx="1512168" cy="400110"/>
           </a:xfrm>
           <a:prstGeom prst="rect">
             <a:avLst/>
@@ -1297,7 +1350,7 @@
           <a:p>
             <a:pPr algn="ctr"/>
             <a:r>
-              <a:rPr lang="es-ES_tradnl" sz="2000" b="0" cap="none" spc="0" dirty="0" smtClean="0">
+              <a:rPr lang="es-ES" sz="2000" b="0" cap="none" spc="0" dirty="0" smtClean="0">
                 <a:ln w="10541" cmpd="sng">
                   <a:solidFill>
                     <a:srgbClr val="C00000"/>
@@ -1309,10 +1362,10 @@
                 </a:solidFill>
                 <a:effectLst/>
               </a:rPr>
-              <a:t>Alberto</a:t>
-            </a:r>
-            <a:r>
-              <a:rPr lang="es-ES_tradnl" sz="2000" b="0" cap="none" spc="0" baseline="0" dirty="0" smtClean="0">
+              <a:t>4.</a:t>
+            </a:r>
+            <a:r>
+              <a:rPr lang="es-ES" sz="2000" b="0" cap="none" spc="0" baseline="0" dirty="0" smtClean="0">
                 <a:ln w="10541" cmpd="sng">
                   <a:solidFill>
                     <a:srgbClr val="C00000"/>
@@ -1324,20 +1377,8 @@
                 </a:solidFill>
                 <a:effectLst/>
               </a:rPr>
-              <a:t> O.</a:t>
-            </a:r>
-            <a:endParaRPr lang="es-ES" sz="2000" b="0" cap="none" spc="0" dirty="0" smtClean="0">
-              <a:ln w="10541" cmpd="sng">
-                <a:solidFill>
-                  <a:srgbClr val="C00000"/>
-                </a:solidFill>
-                <a:prstDash val="solid"/>
-              </a:ln>
-              <a:solidFill>
-                <a:srgbClr val="C00000"/>
-              </a:solidFill>
-              <a:effectLst/>
-            </a:endParaRPr>
+              <a:t> Preguntas</a:t>
+            </a:r>
           </a:p>
         </p:txBody>
       </p:sp>
@@ -1351,202 +1392,13 @@
   <p:clrMapOvr>
     <a:masterClrMapping/>
   </p:clrMapOvr>
-</p:sldLayout>
-</file>
-
-<file path=ppt/slideLayouts/slideLayout6.xml><?xml version="1.0" encoding="utf-8"?>
-<p:sldLayout xmlns:a="http://schemas.openxmlformats.org/drawingml/2006/main" xmlns:r="http://schemas.openxmlformats.org/officeDocument/2006/relationships" xmlns:p="http://schemas.openxmlformats.org/presentationml/2006/main" userDrawn="1">
-  <p:cSld name="Diapositiva de El juego">
-    <p:spTree>
-      <p:nvGrpSpPr>
-        <p:cNvPr id="1" name=""/>
-        <p:cNvGrpSpPr/>
-        <p:nvPr/>
-      </p:nvGrpSpPr>
-      <p:grpSpPr>
-        <a:xfrm>
-          <a:off x="0" y="0"/>
-          <a:ext cx="0" cy="0"/>
-          <a:chOff x="0" y="0"/>
-          <a:chExt cx="0" cy="0"/>
-        </a:xfrm>
-      </p:grpSpPr>
-      <p:sp>
-        <p:nvSpPr>
-          <p:cNvPr id="2" name="1 Título"/>
-          <p:cNvSpPr>
-            <a:spLocks noGrp="1"/>
-          </p:cNvSpPr>
-          <p:nvPr>
-            <p:ph type="title" hasCustomPrompt="1"/>
-          </p:nvPr>
-        </p:nvSpPr>
-        <p:spPr/>
-        <p:txBody>
-          <a:bodyPr/>
-          <a:lstStyle/>
-          <a:p>
-            <a:r>
-              <a:rPr lang="es-ES" dirty="0" smtClean="0"/>
-              <a:t>Cambios</a:t>
-            </a:r>
-            <a:endParaRPr lang="es-ES" dirty="0"/>
-          </a:p>
-        </p:txBody>
-      </p:sp>
-      <p:sp>
-        <p:nvSpPr>
-          <p:cNvPr id="3" name="2 Marcador de número de diapositiva"/>
-          <p:cNvSpPr>
-            <a:spLocks noGrp="1"/>
-          </p:cNvSpPr>
-          <p:nvPr>
-            <p:ph type="sldNum" sz="quarter" idx="10"/>
-          </p:nvPr>
-        </p:nvSpPr>
-        <p:spPr/>
-        <p:txBody>
-          <a:bodyPr/>
-          <a:lstStyle/>
-          <a:p>
-            <a:fld id="{95CB376A-28C7-43B8-86A8-A747AD281D25}" type="slidenum">
-              <a:rPr lang="es-ES" smtClean="0"/>
-              <a:pPr/>
-              <a:t>‹Nº›</a:t>
-            </a:fld>
-            <a:endParaRPr lang="es-ES" dirty="0"/>
-          </a:p>
-        </p:txBody>
-      </p:sp>
-      <p:sp>
-        <p:nvSpPr>
-          <p:cNvPr id="4" name="2 Marcador de texto"/>
-          <p:cNvSpPr>
-            <a:spLocks noGrp="1"/>
-          </p:cNvSpPr>
-          <p:nvPr>
-            <p:ph idx="1"/>
-          </p:nvPr>
-        </p:nvSpPr>
-        <p:spPr>
-          <a:xfrm>
-            <a:off x="457200" y="1628800"/>
-            <a:ext cx="8229600" cy="4176464"/>
-          </a:xfrm>
-          <a:prstGeom prst="rect">
-            <a:avLst/>
-          </a:prstGeom>
-        </p:spPr>
-        <p:txBody>
-          <a:bodyPr vert="horz" lIns="91440" tIns="45720" rIns="91440" bIns="45720" rtlCol="0">
-            <a:normAutofit/>
-          </a:bodyPr>
-          <a:lstStyle/>
-          <a:p>
-            <a:pPr lvl="0"/>
-            <a:r>
-              <a:rPr lang="es-ES" dirty="0" smtClean="0"/>
-              <a:t>Haga clic para modificar el estilo de texto del patrón</a:t>
-            </a:r>
-          </a:p>
-          <a:p>
-            <a:pPr lvl="1"/>
-            <a:r>
-              <a:rPr lang="es-ES" dirty="0" smtClean="0"/>
-              <a:t>Segundo nivel</a:t>
-            </a:r>
-          </a:p>
-          <a:p>
-            <a:pPr lvl="2"/>
-            <a:r>
-              <a:rPr lang="es-ES" dirty="0" smtClean="0"/>
-              <a:t>Tercer nivel</a:t>
-            </a:r>
-          </a:p>
-          <a:p>
-            <a:pPr lvl="3"/>
-            <a:r>
-              <a:rPr lang="es-ES" dirty="0" smtClean="0"/>
-              <a:t>Cuarto nivel</a:t>
-            </a:r>
-          </a:p>
-          <a:p>
-            <a:pPr lvl="4"/>
-            <a:r>
-              <a:rPr lang="es-ES" dirty="0" smtClean="0"/>
-              <a:t>Quinto nivel</a:t>
-            </a:r>
-            <a:endParaRPr lang="es-ES" dirty="0"/>
-          </a:p>
-        </p:txBody>
-      </p:sp>
-      <p:sp>
-        <p:nvSpPr>
-          <p:cNvPr id="5" name="4 CuadroTexto"/>
-          <p:cNvSpPr txBox="1"/>
-          <p:nvPr userDrawn="1"/>
-        </p:nvSpPr>
-        <p:spPr>
-          <a:xfrm>
-            <a:off x="6182488" y="1075864"/>
-            <a:ext cx="2088232" cy="400110"/>
-          </a:xfrm>
-          <a:prstGeom prst="rect">
-            <a:avLst/>
-          </a:prstGeom>
-          <a:noFill/>
-        </p:spPr>
-        <p:txBody>
-          <a:bodyPr wrap="square" rtlCol="0">
-            <a:spAutoFit/>
-          </a:bodyPr>
-          <a:lstStyle/>
-          <a:p>
-            <a:pPr algn="ctr"/>
-            <a:r>
-              <a:rPr lang="es-ES_tradnl" sz="2000" b="0" cap="none" spc="0" dirty="0" smtClean="0">
-                <a:ln w="10541" cmpd="sng">
-                  <a:solidFill>
-                    <a:srgbClr val="C00000"/>
-                  </a:solidFill>
-                  <a:prstDash val="solid"/>
-                </a:ln>
-                <a:solidFill>
-                  <a:srgbClr val="C00000"/>
-                </a:solidFill>
-                <a:effectLst/>
-              </a:rPr>
-              <a:t>Alberto</a:t>
-            </a:r>
-            <a:r>
-              <a:rPr lang="es-ES_tradnl" sz="2000" b="0" cap="none" spc="0" baseline="0" dirty="0" smtClean="0">
-                <a:ln w="10541" cmpd="sng">
-                  <a:solidFill>
-                    <a:srgbClr val="C00000"/>
-                  </a:solidFill>
-                  <a:prstDash val="solid"/>
-                </a:ln>
-                <a:solidFill>
-                  <a:srgbClr val="C00000"/>
-                </a:solidFill>
-                <a:effectLst/>
-              </a:rPr>
-              <a:t> P.</a:t>
-            </a:r>
-            <a:endParaRPr lang="es-ES" sz="2000" dirty="0"/>
-          </a:p>
-        </p:txBody>
-      </p:sp>
-    </p:spTree>
-    <p:extLst>
-      <p:ext uri="{BB962C8B-B14F-4D97-AF65-F5344CB8AC3E}">
-        <p14:creationId xmlns:p14="http://schemas.microsoft.com/office/powerpoint/2010/main" val="1833450865"/>
-      </p:ext>
-    </p:extLst>
-  </p:cSld>
-  <p:clrMapOvr>
-    <a:masterClrMapping/>
-  </p:clrMapOvr>
+  <p:timing>
+    <p:tnLst>
+      <p:par>
+        <p:cTn id="1" dur="indefinite" restart="never" nodeType="tmRoot"/>
+      </p:par>
+    </p:tnLst>
+  </p:timing>
 </p:sldLayout>
 </file>
 
@@ -1605,11 +1457,11 @@
           <p:nvPr userDrawn="1"/>
         </p:nvPicPr>
         <p:blipFill>
-          <a:blip r:embed="rId8">
+          <a:blip r:embed="rId7">
             <a:extLst>
               <a:ext uri="{BEBA8EAE-BF5A-486C-A8C5-ECC9F3942E4B}">
                 <a14:imgProps xmlns:a14="http://schemas.microsoft.com/office/drawing/2010/main">
-                  <a14:imgLayer r:embed="rId9">
+                  <a14:imgLayer r:embed="rId8">
                     <a14:imgEffect>
                       <a14:sharpenSoften amount="-25000"/>
                     </a14:imgEffect>
@@ -1661,10 +1513,6 @@
           </a:bodyPr>
           <a:lstStyle/>
           <a:p>
-            <a:r>
-              <a:rPr lang="es-ES" dirty="0" smtClean="0"/>
-              <a:t>Cambios</a:t>
-            </a:r>
             <a:endParaRPr lang="es-ES" dirty="0"/>
           </a:p>
         </p:txBody>
@@ -1978,8 +1826,8 @@
         </p:nvSpPr>
         <p:spPr>
           <a:xfrm>
-            <a:off x="1178089" y="1071530"/>
-            <a:ext cx="6787822" cy="400113"/>
+            <a:off x="1133091" y="1050863"/>
+            <a:ext cx="6877819" cy="400113"/>
           </a:xfrm>
           <a:prstGeom prst="rect">
             <a:avLst/>
@@ -2038,8 +1886,8 @@
         </p:nvSpPr>
         <p:spPr>
           <a:xfrm>
-            <a:off x="1726283" y="1071533"/>
-            <a:ext cx="659156" cy="400110"/>
+            <a:off x="1133092" y="1050866"/>
+            <a:ext cx="1755545" cy="400110"/>
           </a:xfrm>
           <a:prstGeom prst="rect">
             <a:avLst/>
@@ -2064,7 +1912,20 @@
                 <a:noFill/>
                 <a:effectLst/>
               </a:rPr>
-              <a:t>Dani</a:t>
+              <a:t>1.</a:t>
+            </a:r>
+            <a:r>
+              <a:rPr lang="es-ES" sz="2000" b="0" cap="none" spc="0" baseline="0" dirty="0" smtClean="0">
+                <a:ln w="10541" cmpd="sng">
+                  <a:solidFill>
+                    <a:srgbClr val="C00000"/>
+                  </a:solidFill>
+                  <a:prstDash val="solid"/>
+                </a:ln>
+                <a:noFill/>
+                <a:effectLst/>
+              </a:rPr>
+              <a:t> Introducción</a:t>
             </a:r>
             <a:endParaRPr lang="es-ES" sz="2000" b="0" cap="none" spc="0" dirty="0">
               <a:ln w="10541" cmpd="sng">
@@ -2087,8 +1948,8 @@
         </p:nvSpPr>
         <p:spPr>
           <a:xfrm>
-            <a:off x="2771800" y="1071533"/>
-            <a:ext cx="1080120" cy="400110"/>
+            <a:off x="2888637" y="1050863"/>
+            <a:ext cx="1556278" cy="400110"/>
           </a:xfrm>
           <a:prstGeom prst="rect">
             <a:avLst/>
@@ -2113,7 +1974,20 @@
                 <a:noFill/>
                 <a:effectLst/>
               </a:rPr>
-              <a:t>Isaac</a:t>
+              <a:t>2.</a:t>
+            </a:r>
+            <a:r>
+              <a:rPr lang="es-ES" sz="2000" b="0" cap="none" spc="0" baseline="0" dirty="0" smtClean="0">
+                <a:ln w="10541" cmpd="sng">
+                  <a:solidFill>
+                    <a:srgbClr val="C00000"/>
+                  </a:solidFill>
+                  <a:prstDash val="solid"/>
+                </a:ln>
+                <a:noFill/>
+                <a:effectLst/>
+              </a:rPr>
+              <a:t> Desarrollo</a:t>
             </a:r>
             <a:endParaRPr lang="es-ES" sz="2000" b="0" cap="none" spc="0" dirty="0">
               <a:ln w="10541" cmpd="sng">
@@ -2136,8 +2010,8 @@
         </p:nvSpPr>
         <p:spPr>
           <a:xfrm>
-            <a:off x="5004048" y="1071533"/>
-            <a:ext cx="1440159" cy="400110"/>
+            <a:off x="6498743" y="1050866"/>
+            <a:ext cx="1512168" cy="400110"/>
           </a:xfrm>
           <a:prstGeom prst="rect">
             <a:avLst/>
@@ -2162,92 +2036,8 @@
                 <a:noFill/>
                 <a:effectLst/>
               </a:rPr>
-              <a:t>Alberto O.</a:t>
-            </a:r>
-            <a:endParaRPr lang="es-ES" sz="2000" b="0" cap="none" spc="0" dirty="0">
-              <a:ln w="10541" cmpd="sng">
-                <a:solidFill>
-                  <a:srgbClr val="C00000"/>
-                </a:solidFill>
-                <a:prstDash val="solid"/>
-              </a:ln>
-              <a:noFill/>
-              <a:effectLst/>
-            </a:endParaRPr>
-          </a:p>
-        </p:txBody>
-      </p:sp>
-      <p:sp>
-        <p:nvSpPr>
-          <p:cNvPr id="18" name="17 Rectángulo"/>
-          <p:cNvSpPr/>
-          <p:nvPr userDrawn="1"/>
-        </p:nvSpPr>
-        <p:spPr>
-          <a:xfrm>
-            <a:off x="6633111" y="1071530"/>
-            <a:ext cx="1186608" cy="400110"/>
-          </a:xfrm>
-          <a:prstGeom prst="rect">
-            <a:avLst/>
-          </a:prstGeom>
-          <a:noFill/>
-        </p:spPr>
-        <p:txBody>
-          <a:bodyPr wrap="none" lIns="91440" tIns="45720" rIns="91440" bIns="45720">
-            <a:spAutoFit/>
-          </a:bodyPr>
-          <a:lstStyle/>
-          <a:p>
-            <a:pPr algn="ctr"/>
-            <a:r>
-              <a:rPr lang="es-ES" sz="2000" b="0" cap="none" spc="0" dirty="0" smtClean="0">
-                <a:ln w="10541" cmpd="sng">
-                  <a:solidFill>
-                    <a:srgbClr val="C00000"/>
-                  </a:solidFill>
-                  <a:prstDash val="solid"/>
-                </a:ln>
-                <a:noFill/>
-                <a:effectLst/>
-              </a:rPr>
-              <a:t>Alberto P.</a:t>
-            </a:r>
-            <a:endParaRPr lang="es-ES" sz="2000" b="0" cap="none" spc="0" dirty="0" smtClean="0">
-              <a:ln w="10541" cmpd="sng">
-                <a:solidFill>
-                  <a:srgbClr val="C00000"/>
-                </a:solidFill>
-                <a:prstDash val="solid"/>
-              </a:ln>
-              <a:noFill/>
-              <a:effectLst/>
-            </a:endParaRPr>
-          </a:p>
-        </p:txBody>
-      </p:sp>
-      <p:sp>
-        <p:nvSpPr>
-          <p:cNvPr id="4" name="3 CuadroTexto"/>
-          <p:cNvSpPr txBox="1"/>
-          <p:nvPr userDrawn="1"/>
-        </p:nvSpPr>
-        <p:spPr>
-          <a:xfrm>
-            <a:off x="3995936" y="1081365"/>
-            <a:ext cx="864096" cy="400110"/>
-          </a:xfrm>
-          <a:prstGeom prst="rect">
-            <a:avLst/>
-          </a:prstGeom>
-          <a:noFill/>
-        </p:spPr>
-        <p:txBody>
-          <a:bodyPr wrap="square" rtlCol="0">
-            <a:spAutoFit/>
-          </a:bodyPr>
-          <a:lstStyle/>
-          <a:p>
+              <a:t>4.</a:t>
+            </a:r>
             <a:r>
               <a:rPr lang="es-ES" sz="2000" b="0" cap="none" spc="0" baseline="0" dirty="0" smtClean="0">
                 <a:ln w="10541" cmpd="sng">
@@ -2259,9 +2049,50 @@
                 <a:noFill/>
                 <a:effectLst/>
               </a:rPr>
-              <a:t>Luis</a:t>
-            </a:r>
-            <a:endParaRPr lang="es-ES" sz="2000" dirty="0"/>
+              <a:t> Preguntas</a:t>
+            </a:r>
+          </a:p>
+        </p:txBody>
+      </p:sp>
+      <p:sp>
+        <p:nvSpPr>
+          <p:cNvPr id="4" name="3 CuadroTexto"/>
+          <p:cNvSpPr txBox="1"/>
+          <p:nvPr userDrawn="1"/>
+        </p:nvSpPr>
+        <p:spPr>
+          <a:xfrm>
+            <a:off x="4444915" y="1050866"/>
+            <a:ext cx="2053828" cy="400110"/>
+          </a:xfrm>
+          <a:prstGeom prst="rect">
+            <a:avLst/>
+          </a:prstGeom>
+          <a:noFill/>
+        </p:spPr>
+        <p:txBody>
+          <a:bodyPr wrap="square" rtlCol="0">
+            <a:spAutoFit/>
+          </a:bodyPr>
+          <a:lstStyle/>
+          <a:p>
+            <a:pPr algn="ctr"/>
+            <a:r>
+              <a:rPr lang="es-ES" sz="2000" b="0" cap="none" spc="0" baseline="0" dirty="0" smtClean="0">
+                <a:ln w="10541" cmpd="sng">
+                  <a:solidFill>
+                    <a:srgbClr val="C00000"/>
+                  </a:solidFill>
+                  <a:prstDash val="solid"/>
+                </a:ln>
+                <a:noFill/>
+                <a:effectLst/>
+              </a:rPr>
+              <a:t>3. Valoración final</a:t>
+            </a:r>
+            <a:endParaRPr lang="es-ES" sz="2000" dirty="0">
+              <a:noFill/>
+            </a:endParaRPr>
           </a:p>
         </p:txBody>
       </p:sp>
@@ -2279,7 +2110,6 @@
     <p:sldLayoutId id="2147483652" r:id="rId3"/>
     <p:sldLayoutId id="2147483653" r:id="rId4"/>
     <p:sldLayoutId id="2147483654" r:id="rId5"/>
-    <p:sldLayoutId id="2147483655" r:id="rId6"/>
   </p:sldLayoutIdLst>
   <p:timing>
     <p:tnLst>
@@ -2626,6 +2456,1090 @@
 </p:sld>
 </file>
 
+<file path=ppt/slides/slide10.xml><?xml version="1.0" encoding="utf-8"?>
+<p:sld xmlns:a="http://schemas.openxmlformats.org/drawingml/2006/main" xmlns:r="http://schemas.openxmlformats.org/officeDocument/2006/relationships" xmlns:p="http://schemas.openxmlformats.org/presentationml/2006/main">
+  <p:cSld>
+    <p:spTree>
+      <p:nvGrpSpPr>
+        <p:cNvPr id="1" name=""/>
+        <p:cNvGrpSpPr/>
+        <p:nvPr/>
+      </p:nvGrpSpPr>
+      <p:grpSpPr>
+        <a:xfrm>
+          <a:off x="0" y="0"/>
+          <a:ext cx="0" cy="0"/>
+          <a:chOff x="0" y="0"/>
+          <a:chExt cx="0" cy="0"/>
+        </a:xfrm>
+      </p:grpSpPr>
+      <p:sp>
+        <p:nvSpPr>
+          <p:cNvPr id="2" name="1 Título"/>
+          <p:cNvSpPr>
+            <a:spLocks noGrp="1"/>
+          </p:cNvSpPr>
+          <p:nvPr>
+            <p:ph type="title"/>
+          </p:nvPr>
+        </p:nvSpPr>
+        <p:spPr/>
+        <p:txBody>
+          <a:bodyPr>
+            <a:normAutofit fontScale="90000"/>
+          </a:bodyPr>
+          <a:lstStyle/>
+          <a:p>
+            <a:r>
+              <a:rPr lang="es-ES" dirty="0" smtClean="0"/>
+              <a:t>3. Valoración final</a:t>
+            </a:r>
+            <a:endParaRPr lang="es-ES" dirty="0"/>
+          </a:p>
+        </p:txBody>
+      </p:sp>
+      <p:sp>
+        <p:nvSpPr>
+          <p:cNvPr id="3" name="2 Marcador de número de diapositiva"/>
+          <p:cNvSpPr>
+            <a:spLocks noGrp="1"/>
+          </p:cNvSpPr>
+          <p:nvPr>
+            <p:ph type="sldNum" sz="quarter" idx="10"/>
+          </p:nvPr>
+        </p:nvSpPr>
+        <p:spPr/>
+        <p:txBody>
+          <a:bodyPr/>
+          <a:lstStyle/>
+          <a:p>
+            <a:fld id="{95CB376A-28C7-43B8-86A8-A747AD281D25}" type="slidenum">
+              <a:rPr lang="es-ES" smtClean="0"/>
+              <a:pPr/>
+              <a:t>9</a:t>
+            </a:fld>
+            <a:endParaRPr lang="es-ES" dirty="0"/>
+          </a:p>
+        </p:txBody>
+      </p:sp>
+      <p:sp>
+        <p:nvSpPr>
+          <p:cNvPr id="4" name="3 Marcador de contenido"/>
+          <p:cNvSpPr>
+            <a:spLocks noGrp="1"/>
+          </p:cNvSpPr>
+          <p:nvPr>
+            <p:ph idx="1"/>
+          </p:nvPr>
+        </p:nvSpPr>
+        <p:spPr/>
+        <p:txBody>
+          <a:bodyPr>
+            <a:normAutofit lnSpcReduction="10000"/>
+          </a:bodyPr>
+          <a:lstStyle/>
+          <a:p>
+            <a:r>
+              <a:rPr lang="es-ES" dirty="0" smtClean="0"/>
+              <a:t>Lo que tenemos</a:t>
+            </a:r>
+          </a:p>
+          <a:p>
+            <a:pPr lvl="1"/>
+            <a:r>
+              <a:rPr lang="es-ES" dirty="0" smtClean="0"/>
+              <a:t>Una torreta con funcionalidad</a:t>
+            </a:r>
+          </a:p>
+          <a:p>
+            <a:pPr lvl="1"/>
+            <a:r>
+              <a:rPr lang="es-ES" dirty="0" smtClean="0"/>
+              <a:t>Enemigos que nos atacan: inteligentes</a:t>
+            </a:r>
+          </a:p>
+          <a:p>
+            <a:pPr lvl="1"/>
+            <a:r>
+              <a:rPr lang="es-ES" dirty="0" smtClean="0"/>
+              <a:t>Habilidades para curarnos y atacar</a:t>
+            </a:r>
+          </a:p>
+          <a:p>
+            <a:pPr lvl="1"/>
+            <a:r>
+              <a:rPr lang="es-ES" dirty="0" smtClean="0"/>
+              <a:t>Editor de mapas terminado</a:t>
+            </a:r>
+          </a:p>
+          <a:p>
+            <a:pPr lvl="1"/>
+            <a:r>
+              <a:rPr lang="es-ES" dirty="0" smtClean="0"/>
+              <a:t>Extras:</a:t>
+            </a:r>
+          </a:p>
+          <a:p>
+            <a:pPr lvl="2"/>
+            <a:r>
+              <a:rPr lang="es-ES" dirty="0" smtClean="0"/>
+              <a:t>Pintado de la física</a:t>
+            </a:r>
+          </a:p>
+          <a:p>
+            <a:pPr lvl="2"/>
+            <a:r>
+              <a:rPr lang="es-ES" dirty="0" smtClean="0"/>
+              <a:t>Integración de </a:t>
+            </a:r>
+            <a:r>
+              <a:rPr lang="es-ES" dirty="0" err="1" smtClean="0"/>
+              <a:t>lua</a:t>
+            </a:r>
+            <a:endParaRPr lang="es-ES" dirty="0" smtClean="0"/>
+          </a:p>
+          <a:p>
+            <a:pPr lvl="2"/>
+            <a:r>
+              <a:rPr lang="es-ES" dirty="0" err="1" smtClean="0"/>
+              <a:t>Parseador</a:t>
+            </a:r>
+            <a:r>
+              <a:rPr lang="es-ES" dirty="0" smtClean="0"/>
+              <a:t> de mapas en </a:t>
+            </a:r>
+            <a:r>
+              <a:rPr lang="es-ES" dirty="0" err="1" smtClean="0"/>
+              <a:t>lua</a:t>
+            </a:r>
+            <a:endParaRPr lang="es-ES" dirty="0"/>
+          </a:p>
+        </p:txBody>
+      </p:sp>
+    </p:spTree>
+    <p:extLst>
+      <p:ext uri="{BB962C8B-B14F-4D97-AF65-F5344CB8AC3E}">
+        <p14:creationId xmlns:p14="http://schemas.microsoft.com/office/powerpoint/2010/main" val="3830420791"/>
+      </p:ext>
+    </p:extLst>
+  </p:cSld>
+  <p:clrMapOvr>
+    <a:masterClrMapping/>
+  </p:clrMapOvr>
+  <p:timing>
+    <p:tnLst>
+      <p:par>
+        <p:cTn id="1" dur="indefinite" restart="never" nodeType="tmRoot"/>
+      </p:par>
+    </p:tnLst>
+  </p:timing>
+</p:sld>
+</file>
+
+<file path=ppt/slides/slide11.xml><?xml version="1.0" encoding="utf-8"?>
+<p:sld xmlns:a="http://schemas.openxmlformats.org/drawingml/2006/main" xmlns:r="http://schemas.openxmlformats.org/officeDocument/2006/relationships" xmlns:p="http://schemas.openxmlformats.org/presentationml/2006/main">
+  <p:cSld>
+    <p:spTree>
+      <p:nvGrpSpPr>
+        <p:cNvPr id="1" name=""/>
+        <p:cNvGrpSpPr/>
+        <p:nvPr/>
+      </p:nvGrpSpPr>
+      <p:grpSpPr>
+        <a:xfrm>
+          <a:off x="0" y="0"/>
+          <a:ext cx="0" cy="0"/>
+          <a:chOff x="0" y="0"/>
+          <a:chExt cx="0" cy="0"/>
+        </a:xfrm>
+      </p:grpSpPr>
+      <p:sp>
+        <p:nvSpPr>
+          <p:cNvPr id="2" name="1 Título"/>
+          <p:cNvSpPr>
+            <a:spLocks noGrp="1"/>
+          </p:cNvSpPr>
+          <p:nvPr>
+            <p:ph type="title"/>
+          </p:nvPr>
+        </p:nvSpPr>
+        <p:spPr/>
+        <p:txBody>
+          <a:bodyPr>
+            <a:normAutofit fontScale="90000"/>
+          </a:bodyPr>
+          <a:lstStyle/>
+          <a:p>
+            <a:r>
+              <a:rPr lang="es-ES" dirty="0" smtClean="0"/>
+              <a:t>3. Valoración final</a:t>
+            </a:r>
+            <a:endParaRPr lang="es-ES" dirty="0"/>
+          </a:p>
+        </p:txBody>
+      </p:sp>
+      <p:sp>
+        <p:nvSpPr>
+          <p:cNvPr id="3" name="2 Marcador de número de diapositiva"/>
+          <p:cNvSpPr>
+            <a:spLocks noGrp="1"/>
+          </p:cNvSpPr>
+          <p:nvPr>
+            <p:ph type="sldNum" sz="quarter" idx="10"/>
+          </p:nvPr>
+        </p:nvSpPr>
+        <p:spPr/>
+        <p:txBody>
+          <a:bodyPr/>
+          <a:lstStyle/>
+          <a:p>
+            <a:fld id="{95CB376A-28C7-43B8-86A8-A747AD281D25}" type="slidenum">
+              <a:rPr lang="es-ES" smtClean="0"/>
+              <a:pPr/>
+              <a:t>10</a:t>
+            </a:fld>
+            <a:endParaRPr lang="es-ES" dirty="0"/>
+          </a:p>
+        </p:txBody>
+      </p:sp>
+      <p:sp>
+        <p:nvSpPr>
+          <p:cNvPr id="4" name="3 Marcador de contenido"/>
+          <p:cNvSpPr>
+            <a:spLocks noGrp="1"/>
+          </p:cNvSpPr>
+          <p:nvPr>
+            <p:ph idx="1"/>
+          </p:nvPr>
+        </p:nvSpPr>
+        <p:spPr/>
+        <p:txBody>
+          <a:bodyPr/>
+          <a:lstStyle/>
+          <a:p>
+            <a:r>
+              <a:rPr lang="es-ES" dirty="0" smtClean="0"/>
+              <a:t>Conclusión</a:t>
+            </a:r>
+          </a:p>
+          <a:p>
+            <a:pPr lvl="1"/>
+            <a:r>
+              <a:rPr lang="es-ES" dirty="0" smtClean="0"/>
+              <a:t>Buen ritmo de trabajo, al igual que en el hito 1</a:t>
+            </a:r>
+          </a:p>
+          <a:p>
+            <a:pPr lvl="1"/>
+            <a:r>
+              <a:rPr lang="es-ES" dirty="0" smtClean="0"/>
+              <a:t>Mas arquitectura que funcionalidad</a:t>
+            </a:r>
+          </a:p>
+          <a:p>
+            <a:pPr lvl="1"/>
+            <a:r>
+              <a:rPr lang="es-ES" dirty="0" smtClean="0"/>
+              <a:t>Por tanto menos resultado visual</a:t>
+            </a:r>
+          </a:p>
+          <a:p>
+            <a:pPr lvl="1"/>
+            <a:r>
+              <a:rPr lang="es-ES" dirty="0" smtClean="0"/>
+              <a:t>Pero…</a:t>
+            </a:r>
+            <a:endParaRPr lang="es-ES" dirty="0"/>
+          </a:p>
+        </p:txBody>
+      </p:sp>
+    </p:spTree>
+    <p:extLst>
+      <p:ext uri="{BB962C8B-B14F-4D97-AF65-F5344CB8AC3E}">
+        <p14:creationId xmlns:p14="http://schemas.microsoft.com/office/powerpoint/2010/main" val="3976005005"/>
+      </p:ext>
+    </p:extLst>
+  </p:cSld>
+  <p:clrMapOvr>
+    <a:masterClrMapping/>
+  </p:clrMapOvr>
+  <p:timing>
+    <p:tnLst>
+      <p:par>
+        <p:cTn id="1" dur="indefinite" restart="never" nodeType="tmRoot"/>
+      </p:par>
+    </p:tnLst>
+  </p:timing>
+</p:sld>
+</file>
+
+<file path=ppt/slides/slide12.xml><?xml version="1.0" encoding="utf-8"?>
+<p:sld xmlns:a="http://schemas.openxmlformats.org/drawingml/2006/main" xmlns:r="http://schemas.openxmlformats.org/officeDocument/2006/relationships" xmlns:p="http://schemas.openxmlformats.org/presentationml/2006/main">
+  <p:cSld>
+    <p:spTree>
+      <p:nvGrpSpPr>
+        <p:cNvPr id="1" name=""/>
+        <p:cNvGrpSpPr/>
+        <p:nvPr/>
+      </p:nvGrpSpPr>
+      <p:grpSpPr>
+        <a:xfrm>
+          <a:off x="0" y="0"/>
+          <a:ext cx="0" cy="0"/>
+          <a:chOff x="0" y="0"/>
+          <a:chExt cx="0" cy="0"/>
+        </a:xfrm>
+      </p:grpSpPr>
+      <p:sp>
+        <p:nvSpPr>
+          <p:cNvPr id="2" name="1 Título"/>
+          <p:cNvSpPr>
+            <a:spLocks noGrp="1"/>
+          </p:cNvSpPr>
+          <p:nvPr>
+            <p:ph type="title"/>
+          </p:nvPr>
+        </p:nvSpPr>
+        <p:spPr/>
+        <p:txBody>
+          <a:bodyPr>
+            <a:normAutofit fontScale="90000"/>
+          </a:bodyPr>
+          <a:lstStyle/>
+          <a:p>
+            <a:r>
+              <a:rPr lang="es-ES" dirty="0" smtClean="0"/>
+              <a:t>3. Valoración final</a:t>
+            </a:r>
+            <a:endParaRPr lang="es-ES" dirty="0"/>
+          </a:p>
+        </p:txBody>
+      </p:sp>
+      <p:sp>
+        <p:nvSpPr>
+          <p:cNvPr id="3" name="2 Marcador de número de diapositiva"/>
+          <p:cNvSpPr>
+            <a:spLocks noGrp="1"/>
+          </p:cNvSpPr>
+          <p:nvPr>
+            <p:ph type="sldNum" sz="quarter" idx="10"/>
+          </p:nvPr>
+        </p:nvSpPr>
+        <p:spPr/>
+        <p:txBody>
+          <a:bodyPr/>
+          <a:lstStyle/>
+          <a:p>
+            <a:fld id="{95CB376A-28C7-43B8-86A8-A747AD281D25}" type="slidenum">
+              <a:rPr lang="es-ES" smtClean="0"/>
+              <a:pPr/>
+              <a:t>11</a:t>
+            </a:fld>
+            <a:endParaRPr lang="es-ES" dirty="0"/>
+          </a:p>
+        </p:txBody>
+      </p:sp>
+      <p:sp>
+        <p:nvSpPr>
+          <p:cNvPr id="4" name="3 Marcador de contenido"/>
+          <p:cNvSpPr>
+            <a:spLocks noGrp="1"/>
+          </p:cNvSpPr>
+          <p:nvPr>
+            <p:ph idx="1"/>
+          </p:nvPr>
+        </p:nvSpPr>
+        <p:spPr/>
+        <p:txBody>
+          <a:bodyPr/>
+          <a:lstStyle/>
+          <a:p>
+            <a:r>
+              <a:rPr lang="es-ES" dirty="0" smtClean="0"/>
+              <a:t>¡</a:t>
+            </a:r>
+            <a:r>
+              <a:rPr lang="es-ES" dirty="0" err="1" smtClean="0"/>
+              <a:t>Habemus</a:t>
+            </a:r>
+            <a:r>
+              <a:rPr lang="es-ES" dirty="0" smtClean="0"/>
+              <a:t> artistas!</a:t>
+            </a:r>
+          </a:p>
+          <a:p>
+            <a:pPr lvl="1"/>
+            <a:r>
+              <a:rPr lang="es-ES" dirty="0" smtClean="0"/>
+              <a:t>En proceso:</a:t>
+            </a:r>
+          </a:p>
+          <a:p>
+            <a:pPr lvl="2"/>
+            <a:r>
+              <a:rPr lang="es-ES" dirty="0" smtClean="0"/>
+              <a:t>Modelo de Jack, el marine</a:t>
+            </a:r>
+          </a:p>
+          <a:p>
+            <a:pPr lvl="2"/>
+            <a:r>
+              <a:rPr lang="es-ES" dirty="0" smtClean="0"/>
+              <a:t>Modelo del vampiro básico</a:t>
+            </a:r>
+          </a:p>
+          <a:p>
+            <a:pPr lvl="2"/>
+            <a:r>
+              <a:rPr lang="es-ES" dirty="0" smtClean="0"/>
+              <a:t>Modelos de edificios</a:t>
+            </a:r>
+            <a:endParaRPr lang="es-ES" dirty="0"/>
+          </a:p>
+        </p:txBody>
+      </p:sp>
+    </p:spTree>
+    <p:extLst>
+      <p:ext uri="{BB962C8B-B14F-4D97-AF65-F5344CB8AC3E}">
+        <p14:creationId xmlns:p14="http://schemas.microsoft.com/office/powerpoint/2010/main" val="462282373"/>
+      </p:ext>
+    </p:extLst>
+  </p:cSld>
+  <p:clrMapOvr>
+    <a:masterClrMapping/>
+  </p:clrMapOvr>
+  <p:timing>
+    <p:tnLst>
+      <p:par>
+        <p:cTn id="1" dur="indefinite" restart="never" nodeType="tmRoot"/>
+      </p:par>
+    </p:tnLst>
+  </p:timing>
+</p:sld>
+</file>
+
+<file path=ppt/slides/slide13.xml><?xml version="1.0" encoding="utf-8"?>
+<p:sld xmlns:a="http://schemas.openxmlformats.org/drawingml/2006/main" xmlns:r="http://schemas.openxmlformats.org/officeDocument/2006/relationships" xmlns:p="http://schemas.openxmlformats.org/presentationml/2006/main">
+  <p:cSld>
+    <p:spTree>
+      <p:nvGrpSpPr>
+        <p:cNvPr id="1" name=""/>
+        <p:cNvGrpSpPr/>
+        <p:nvPr/>
+      </p:nvGrpSpPr>
+      <p:grpSpPr>
+        <a:xfrm>
+          <a:off x="0" y="0"/>
+          <a:ext cx="0" cy="0"/>
+          <a:chOff x="0" y="0"/>
+          <a:chExt cx="0" cy="0"/>
+        </a:xfrm>
+      </p:grpSpPr>
+      <p:sp>
+        <p:nvSpPr>
+          <p:cNvPr id="2" name="1 Título"/>
+          <p:cNvSpPr>
+            <a:spLocks noGrp="1"/>
+          </p:cNvSpPr>
+          <p:nvPr>
+            <p:ph type="title"/>
+          </p:nvPr>
+        </p:nvSpPr>
+        <p:spPr/>
+        <p:txBody>
+          <a:bodyPr>
+            <a:normAutofit fontScale="90000"/>
+          </a:bodyPr>
+          <a:lstStyle/>
+          <a:p>
+            <a:r>
+              <a:rPr lang="es-ES" dirty="0" smtClean="0"/>
+              <a:t>3. Valoración final</a:t>
+            </a:r>
+            <a:endParaRPr lang="es-ES" dirty="0"/>
+          </a:p>
+        </p:txBody>
+      </p:sp>
+      <p:sp>
+        <p:nvSpPr>
+          <p:cNvPr id="3" name="2 Marcador de número de diapositiva"/>
+          <p:cNvSpPr>
+            <a:spLocks noGrp="1"/>
+          </p:cNvSpPr>
+          <p:nvPr>
+            <p:ph type="sldNum" sz="quarter" idx="10"/>
+          </p:nvPr>
+        </p:nvSpPr>
+        <p:spPr/>
+        <p:txBody>
+          <a:bodyPr/>
+          <a:lstStyle/>
+          <a:p>
+            <a:fld id="{95CB376A-28C7-43B8-86A8-A747AD281D25}" type="slidenum">
+              <a:rPr lang="es-ES" smtClean="0"/>
+              <a:pPr/>
+              <a:t>12</a:t>
+            </a:fld>
+            <a:endParaRPr lang="es-ES" dirty="0"/>
+          </a:p>
+        </p:txBody>
+      </p:sp>
+      <p:sp>
+        <p:nvSpPr>
+          <p:cNvPr id="4" name="3 Marcador de contenido"/>
+          <p:cNvSpPr>
+            <a:spLocks noGrp="1"/>
+          </p:cNvSpPr>
+          <p:nvPr>
+            <p:ph idx="1"/>
+          </p:nvPr>
+        </p:nvSpPr>
+        <p:spPr/>
+        <p:txBody>
+          <a:bodyPr/>
+          <a:lstStyle/>
+          <a:p>
+            <a:r>
+              <a:rPr lang="es-ES" dirty="0" smtClean="0"/>
+              <a:t>Muestras</a:t>
+            </a:r>
+            <a:endParaRPr lang="es-ES" dirty="0"/>
+          </a:p>
+        </p:txBody>
+      </p:sp>
+      <p:pic>
+        <p:nvPicPr>
+          <p:cNvPr id="9" name="8 Imagen"/>
+          <p:cNvPicPr>
+            <a:picLocks noChangeAspect="1"/>
+          </p:cNvPicPr>
+          <p:nvPr/>
+        </p:nvPicPr>
+        <p:blipFill>
+          <a:blip r:embed="rId2">
+            <a:extLst>
+              <a:ext uri="{28A0092B-C50C-407E-A947-70E740481C1C}">
+                <a14:useLocalDpi xmlns:a14="http://schemas.microsoft.com/office/drawing/2010/main" val="0"/>
+              </a:ext>
+            </a:extLst>
+          </a:blip>
+          <a:stretch>
+            <a:fillRect/>
+          </a:stretch>
+        </p:blipFill>
+        <p:spPr>
+          <a:xfrm>
+            <a:off x="4335362" y="1983135"/>
+            <a:ext cx="4248133" cy="3186100"/>
+          </a:xfrm>
+          <a:prstGeom prst="rect">
+            <a:avLst/>
+          </a:prstGeom>
+        </p:spPr>
+      </p:pic>
+      <p:pic>
+        <p:nvPicPr>
+          <p:cNvPr id="11" name="10 Imagen"/>
+          <p:cNvPicPr>
+            <a:picLocks noChangeAspect="1"/>
+          </p:cNvPicPr>
+          <p:nvPr/>
+        </p:nvPicPr>
+        <p:blipFill>
+          <a:blip r:embed="rId3">
+            <a:extLst>
+              <a:ext uri="{28A0092B-C50C-407E-A947-70E740481C1C}">
+                <a14:useLocalDpi xmlns:a14="http://schemas.microsoft.com/office/drawing/2010/main" val="0"/>
+              </a:ext>
+            </a:extLst>
+          </a:blip>
+          <a:stretch>
+            <a:fillRect/>
+          </a:stretch>
+        </p:blipFill>
+        <p:spPr>
+          <a:xfrm>
+            <a:off x="840518" y="2081447"/>
+            <a:ext cx="4117050" cy="3087788"/>
+          </a:xfrm>
+          <a:prstGeom prst="rect">
+            <a:avLst/>
+          </a:prstGeom>
+        </p:spPr>
+      </p:pic>
+    </p:spTree>
+    <p:extLst>
+      <p:ext uri="{BB962C8B-B14F-4D97-AF65-F5344CB8AC3E}">
+        <p14:creationId xmlns:p14="http://schemas.microsoft.com/office/powerpoint/2010/main" val="3383840176"/>
+      </p:ext>
+    </p:extLst>
+  </p:cSld>
+  <p:clrMapOvr>
+    <a:masterClrMapping/>
+  </p:clrMapOvr>
+  <p:timing>
+    <p:tnLst>
+      <p:par>
+        <p:cTn id="1" dur="indefinite" restart="never" nodeType="tmRoot"/>
+      </p:par>
+    </p:tnLst>
+  </p:timing>
+</p:sld>
+</file>
+
+<file path=ppt/slides/slide14.xml><?xml version="1.0" encoding="utf-8"?>
+<p:sld xmlns:a="http://schemas.openxmlformats.org/drawingml/2006/main" xmlns:r="http://schemas.openxmlformats.org/officeDocument/2006/relationships" xmlns:p="http://schemas.openxmlformats.org/presentationml/2006/main">
+  <p:cSld>
+    <p:spTree>
+      <p:nvGrpSpPr>
+        <p:cNvPr id="1" name=""/>
+        <p:cNvGrpSpPr/>
+        <p:nvPr/>
+      </p:nvGrpSpPr>
+      <p:grpSpPr>
+        <a:xfrm>
+          <a:off x="0" y="0"/>
+          <a:ext cx="0" cy="0"/>
+          <a:chOff x="0" y="0"/>
+          <a:chExt cx="0" cy="0"/>
+        </a:xfrm>
+      </p:grpSpPr>
+      <p:sp>
+        <p:nvSpPr>
+          <p:cNvPr id="2" name="1 Título"/>
+          <p:cNvSpPr>
+            <a:spLocks noGrp="1"/>
+          </p:cNvSpPr>
+          <p:nvPr>
+            <p:ph type="title"/>
+          </p:nvPr>
+        </p:nvSpPr>
+        <p:spPr/>
+        <p:txBody>
+          <a:bodyPr>
+            <a:normAutofit fontScale="90000"/>
+          </a:bodyPr>
+          <a:lstStyle/>
+          <a:p>
+            <a:r>
+              <a:rPr lang="es-ES" dirty="0" smtClean="0"/>
+              <a:t>3. Valoración final</a:t>
+            </a:r>
+            <a:endParaRPr lang="es-ES" dirty="0"/>
+          </a:p>
+        </p:txBody>
+      </p:sp>
+      <p:sp>
+        <p:nvSpPr>
+          <p:cNvPr id="3" name="2 Marcador de número de diapositiva"/>
+          <p:cNvSpPr>
+            <a:spLocks noGrp="1"/>
+          </p:cNvSpPr>
+          <p:nvPr>
+            <p:ph type="sldNum" sz="quarter" idx="10"/>
+          </p:nvPr>
+        </p:nvSpPr>
+        <p:spPr/>
+        <p:txBody>
+          <a:bodyPr/>
+          <a:lstStyle/>
+          <a:p>
+            <a:fld id="{95CB376A-28C7-43B8-86A8-A747AD281D25}" type="slidenum">
+              <a:rPr lang="es-ES" smtClean="0"/>
+              <a:pPr/>
+              <a:t>13</a:t>
+            </a:fld>
+            <a:endParaRPr lang="es-ES" dirty="0"/>
+          </a:p>
+        </p:txBody>
+      </p:sp>
+      <p:sp>
+        <p:nvSpPr>
+          <p:cNvPr id="4" name="3 Marcador de contenido"/>
+          <p:cNvSpPr>
+            <a:spLocks noGrp="1"/>
+          </p:cNvSpPr>
+          <p:nvPr>
+            <p:ph idx="1"/>
+          </p:nvPr>
+        </p:nvSpPr>
+        <p:spPr/>
+        <p:txBody>
+          <a:bodyPr/>
+          <a:lstStyle/>
+          <a:p>
+            <a:r>
+              <a:rPr lang="es-ES" dirty="0" smtClean="0"/>
+              <a:t>Muestras</a:t>
+            </a:r>
+            <a:endParaRPr lang="es-ES" dirty="0"/>
+          </a:p>
+        </p:txBody>
+      </p:sp>
+      <p:pic>
+        <p:nvPicPr>
+          <p:cNvPr id="5" name="4 Imagen"/>
+          <p:cNvPicPr>
+            <a:picLocks noChangeAspect="1"/>
+          </p:cNvPicPr>
+          <p:nvPr/>
+        </p:nvPicPr>
+        <p:blipFill>
+          <a:blip r:embed="rId2">
+            <a:extLst>
+              <a:ext uri="{28A0092B-C50C-407E-A947-70E740481C1C}">
+                <a14:useLocalDpi xmlns:a14="http://schemas.microsoft.com/office/drawing/2010/main" val="0"/>
+              </a:ext>
+            </a:extLst>
+          </a:blip>
+          <a:stretch>
+            <a:fillRect/>
+          </a:stretch>
+        </p:blipFill>
+        <p:spPr>
+          <a:xfrm>
+            <a:off x="2987824" y="1635070"/>
+            <a:ext cx="3133874" cy="4170194"/>
+          </a:xfrm>
+          <a:prstGeom prst="rect">
+            <a:avLst/>
+          </a:prstGeom>
+        </p:spPr>
+      </p:pic>
+    </p:spTree>
+    <p:extLst>
+      <p:ext uri="{BB962C8B-B14F-4D97-AF65-F5344CB8AC3E}">
+        <p14:creationId xmlns:p14="http://schemas.microsoft.com/office/powerpoint/2010/main" val="756563718"/>
+      </p:ext>
+    </p:extLst>
+  </p:cSld>
+  <p:clrMapOvr>
+    <a:masterClrMapping/>
+  </p:clrMapOvr>
+  <p:timing>
+    <p:tnLst>
+      <p:par>
+        <p:cTn id="1" dur="indefinite" restart="never" nodeType="tmRoot"/>
+      </p:par>
+    </p:tnLst>
+  </p:timing>
+</p:sld>
+</file>
+
+<file path=ppt/slides/slide15.xml><?xml version="1.0" encoding="utf-8"?>
+<p:sld xmlns:a="http://schemas.openxmlformats.org/drawingml/2006/main" xmlns:r="http://schemas.openxmlformats.org/officeDocument/2006/relationships" xmlns:p="http://schemas.openxmlformats.org/presentationml/2006/main">
+  <p:cSld>
+    <p:spTree>
+      <p:nvGrpSpPr>
+        <p:cNvPr id="1" name=""/>
+        <p:cNvGrpSpPr/>
+        <p:nvPr/>
+      </p:nvGrpSpPr>
+      <p:grpSpPr>
+        <a:xfrm>
+          <a:off x="0" y="0"/>
+          <a:ext cx="0" cy="0"/>
+          <a:chOff x="0" y="0"/>
+          <a:chExt cx="0" cy="0"/>
+        </a:xfrm>
+      </p:grpSpPr>
+      <p:sp>
+        <p:nvSpPr>
+          <p:cNvPr id="2" name="1 Título"/>
+          <p:cNvSpPr>
+            <a:spLocks noGrp="1"/>
+          </p:cNvSpPr>
+          <p:nvPr>
+            <p:ph type="title"/>
+          </p:nvPr>
+        </p:nvSpPr>
+        <p:spPr/>
+        <p:txBody>
+          <a:bodyPr>
+            <a:normAutofit fontScale="90000"/>
+          </a:bodyPr>
+          <a:lstStyle/>
+          <a:p>
+            <a:r>
+              <a:rPr lang="es-ES" dirty="0" smtClean="0"/>
+              <a:t>3. Valoración final</a:t>
+            </a:r>
+            <a:endParaRPr lang="es-ES" dirty="0"/>
+          </a:p>
+        </p:txBody>
+      </p:sp>
+      <p:sp>
+        <p:nvSpPr>
+          <p:cNvPr id="3" name="2 Marcador de número de diapositiva"/>
+          <p:cNvSpPr>
+            <a:spLocks noGrp="1"/>
+          </p:cNvSpPr>
+          <p:nvPr>
+            <p:ph type="sldNum" sz="quarter" idx="10"/>
+          </p:nvPr>
+        </p:nvSpPr>
+        <p:spPr/>
+        <p:txBody>
+          <a:bodyPr/>
+          <a:lstStyle/>
+          <a:p>
+            <a:fld id="{95CB376A-28C7-43B8-86A8-A747AD281D25}" type="slidenum">
+              <a:rPr lang="es-ES" smtClean="0"/>
+              <a:pPr/>
+              <a:t>14</a:t>
+            </a:fld>
+            <a:endParaRPr lang="es-ES" dirty="0"/>
+          </a:p>
+        </p:txBody>
+      </p:sp>
+      <p:sp>
+        <p:nvSpPr>
+          <p:cNvPr id="4" name="3 Marcador de contenido"/>
+          <p:cNvSpPr>
+            <a:spLocks noGrp="1"/>
+          </p:cNvSpPr>
+          <p:nvPr>
+            <p:ph idx="1"/>
+          </p:nvPr>
+        </p:nvSpPr>
+        <p:spPr/>
+        <p:txBody>
+          <a:bodyPr/>
+          <a:lstStyle/>
+          <a:p>
+            <a:r>
+              <a:rPr lang="es-ES" dirty="0" smtClean="0"/>
+              <a:t>Muestras</a:t>
+            </a:r>
+            <a:endParaRPr lang="es-ES" dirty="0"/>
+          </a:p>
+        </p:txBody>
+      </p:sp>
+      <p:pic>
+        <p:nvPicPr>
+          <p:cNvPr id="5" name="4 Imagen"/>
+          <p:cNvPicPr>
+            <a:picLocks noChangeAspect="1"/>
+          </p:cNvPicPr>
+          <p:nvPr/>
+        </p:nvPicPr>
+        <p:blipFill>
+          <a:blip r:embed="rId2" cstate="print">
+            <a:extLst>
+              <a:ext uri="{28A0092B-C50C-407E-A947-70E740481C1C}">
+                <a14:useLocalDpi xmlns:a14="http://schemas.microsoft.com/office/drawing/2010/main" val="0"/>
+              </a:ext>
+            </a:extLst>
+          </a:blip>
+          <a:stretch>
+            <a:fillRect/>
+          </a:stretch>
+        </p:blipFill>
+        <p:spPr>
+          <a:xfrm>
+            <a:off x="3504741" y="1735143"/>
+            <a:ext cx="2267744" cy="1603557"/>
+          </a:xfrm>
+          <a:prstGeom prst="rect">
+            <a:avLst/>
+          </a:prstGeom>
+        </p:spPr>
+      </p:pic>
+      <p:pic>
+        <p:nvPicPr>
+          <p:cNvPr id="6" name="5 Imagen"/>
+          <p:cNvPicPr>
+            <a:picLocks noChangeAspect="1"/>
+          </p:cNvPicPr>
+          <p:nvPr/>
+        </p:nvPicPr>
+        <p:blipFill>
+          <a:blip r:embed="rId3" cstate="print">
+            <a:extLst>
+              <a:ext uri="{28A0092B-C50C-407E-A947-70E740481C1C}">
+                <a14:useLocalDpi xmlns:a14="http://schemas.microsoft.com/office/drawing/2010/main" val="0"/>
+              </a:ext>
+            </a:extLst>
+          </a:blip>
+          <a:stretch>
+            <a:fillRect/>
+          </a:stretch>
+        </p:blipFill>
+        <p:spPr>
+          <a:xfrm>
+            <a:off x="251520" y="3356992"/>
+            <a:ext cx="4211960" cy="2285866"/>
+          </a:xfrm>
+          <a:prstGeom prst="rect">
+            <a:avLst/>
+          </a:prstGeom>
+        </p:spPr>
+      </p:pic>
+      <p:pic>
+        <p:nvPicPr>
+          <p:cNvPr id="7" name="6 Imagen"/>
+          <p:cNvPicPr>
+            <a:picLocks noChangeAspect="1"/>
+          </p:cNvPicPr>
+          <p:nvPr/>
+        </p:nvPicPr>
+        <p:blipFill>
+          <a:blip r:embed="rId4" cstate="print">
+            <a:extLst>
+              <a:ext uri="{28A0092B-C50C-407E-A947-70E740481C1C}">
+                <a14:useLocalDpi xmlns:a14="http://schemas.microsoft.com/office/drawing/2010/main" val="0"/>
+              </a:ext>
+            </a:extLst>
+          </a:blip>
+          <a:stretch>
+            <a:fillRect/>
+          </a:stretch>
+        </p:blipFill>
+        <p:spPr>
+          <a:xfrm>
+            <a:off x="4638613" y="3356993"/>
+            <a:ext cx="4220060" cy="2285866"/>
+          </a:xfrm>
+          <a:prstGeom prst="rect">
+            <a:avLst/>
+          </a:prstGeom>
+        </p:spPr>
+      </p:pic>
+    </p:spTree>
+    <p:extLst>
+      <p:ext uri="{BB962C8B-B14F-4D97-AF65-F5344CB8AC3E}">
+        <p14:creationId xmlns:p14="http://schemas.microsoft.com/office/powerpoint/2010/main" val="3171187498"/>
+      </p:ext>
+    </p:extLst>
+  </p:cSld>
+  <p:clrMapOvr>
+    <a:masterClrMapping/>
+  </p:clrMapOvr>
+  <p:timing>
+    <p:tnLst>
+      <p:par>
+        <p:cTn id="1" dur="indefinite" restart="never" nodeType="tmRoot"/>
+      </p:par>
+    </p:tnLst>
+  </p:timing>
+</p:sld>
+</file>
+
+<file path=ppt/slides/slide16.xml><?xml version="1.0" encoding="utf-8"?>
+<p:sld xmlns:a="http://schemas.openxmlformats.org/drawingml/2006/main" xmlns:r="http://schemas.openxmlformats.org/officeDocument/2006/relationships" xmlns:p="http://schemas.openxmlformats.org/presentationml/2006/main">
+  <p:cSld>
+    <p:spTree>
+      <p:nvGrpSpPr>
+        <p:cNvPr id="1" name=""/>
+        <p:cNvGrpSpPr/>
+        <p:nvPr/>
+      </p:nvGrpSpPr>
+      <p:grpSpPr>
+        <a:xfrm>
+          <a:off x="0" y="0"/>
+          <a:ext cx="0" cy="0"/>
+          <a:chOff x="0" y="0"/>
+          <a:chExt cx="0" cy="0"/>
+        </a:xfrm>
+      </p:grpSpPr>
+      <p:sp>
+        <p:nvSpPr>
+          <p:cNvPr id="2" name="1 Título"/>
+          <p:cNvSpPr>
+            <a:spLocks noGrp="1"/>
+          </p:cNvSpPr>
+          <p:nvPr>
+            <p:ph type="title"/>
+          </p:nvPr>
+        </p:nvSpPr>
+        <p:spPr/>
+        <p:txBody>
+          <a:bodyPr>
+            <a:normAutofit fontScale="90000"/>
+          </a:bodyPr>
+          <a:lstStyle/>
+          <a:p>
+            <a:r>
+              <a:rPr lang="es-ES" dirty="0" smtClean="0"/>
+              <a:t>4. Preguntas</a:t>
+            </a:r>
+            <a:endParaRPr lang="es-ES" dirty="0"/>
+          </a:p>
+        </p:txBody>
+      </p:sp>
+      <p:sp>
+        <p:nvSpPr>
+          <p:cNvPr id="3" name="2 Marcador de número de diapositiva"/>
+          <p:cNvSpPr>
+            <a:spLocks noGrp="1"/>
+          </p:cNvSpPr>
+          <p:nvPr>
+            <p:ph type="sldNum" sz="quarter" idx="10"/>
+          </p:nvPr>
+        </p:nvSpPr>
+        <p:spPr/>
+        <p:txBody>
+          <a:bodyPr/>
+          <a:lstStyle/>
+          <a:p>
+            <a:fld id="{95CB376A-28C7-43B8-86A8-A747AD281D25}" type="slidenum">
+              <a:rPr lang="es-ES" smtClean="0"/>
+              <a:pPr/>
+              <a:t>15</a:t>
+            </a:fld>
+            <a:endParaRPr lang="es-ES" dirty="0"/>
+          </a:p>
+        </p:txBody>
+      </p:sp>
+      <p:pic>
+        <p:nvPicPr>
+          <p:cNvPr id="7" name="6 Marcador de contenido"/>
+          <p:cNvPicPr>
+            <a:picLocks noGrp="1" noChangeAspect="1"/>
+          </p:cNvPicPr>
+          <p:nvPr>
+            <p:ph idx="1"/>
+          </p:nvPr>
+        </p:nvPicPr>
+        <p:blipFill>
+          <a:blip r:embed="rId2">
+            <a:extLst>
+              <a:ext uri="{28A0092B-C50C-407E-A947-70E740481C1C}">
+                <a14:useLocalDpi xmlns:a14="http://schemas.microsoft.com/office/drawing/2010/main" val="0"/>
+              </a:ext>
+            </a:extLst>
+          </a:blip>
+          <a:stretch>
+            <a:fillRect/>
+          </a:stretch>
+        </p:blipFill>
+        <p:spPr>
+          <a:xfrm>
+            <a:off x="2032000" y="1812131"/>
+            <a:ext cx="5080000" cy="3810000"/>
+          </a:xfrm>
+        </p:spPr>
+      </p:pic>
+    </p:spTree>
+    <p:extLst>
+      <p:ext uri="{BB962C8B-B14F-4D97-AF65-F5344CB8AC3E}">
+        <p14:creationId xmlns:p14="http://schemas.microsoft.com/office/powerpoint/2010/main" val="3085704438"/>
+      </p:ext>
+    </p:extLst>
+  </p:cSld>
+  <p:clrMapOvr>
+    <a:masterClrMapping/>
+  </p:clrMapOvr>
+  <p:timing>
+    <p:tnLst>
+      <p:par>
+        <p:cTn id="1" dur="indefinite" restart="never" nodeType="tmRoot"/>
+      </p:par>
+    </p:tnLst>
+  </p:timing>
+</p:sld>
+</file>
+
 <file path=ppt/slides/slide2.xml><?xml version="1.0" encoding="utf-8"?>
 <p:sld xmlns:a="http://schemas.openxmlformats.org/drawingml/2006/main" xmlns:r="http://schemas.openxmlformats.org/officeDocument/2006/relationships" xmlns:p="http://schemas.openxmlformats.org/presentationml/2006/main">
   <p:cSld>
@@ -2660,7 +3574,11 @@
           </a:bodyPr>
           <a:lstStyle/>
           <a:p>
-            <a:endParaRPr lang="es-ES"/>
+            <a:r>
+              <a:rPr lang="es-ES" dirty="0" smtClean="0"/>
+              <a:t>1. Introducción</a:t>
+            </a:r>
+            <a:endParaRPr lang="es-ES" dirty="0"/>
           </a:p>
         </p:txBody>
       </p:sp>
@@ -2700,23 +3618,82 @@
         </p:nvSpPr>
         <p:spPr/>
         <p:txBody>
-          <a:bodyPr/>
-          <a:lstStyle/>
-          <a:p>
-            <a:endParaRPr lang="es-ES"/>
+          <a:bodyPr>
+            <a:normAutofit lnSpcReduction="10000"/>
+          </a:bodyPr>
+          <a:lstStyle/>
+          <a:p>
+            <a:r>
+              <a:rPr lang="es-ES" dirty="0" smtClean="0"/>
+              <a:t>En el hito 1 partimos de:</a:t>
+            </a:r>
+          </a:p>
+          <a:p>
+            <a:pPr lvl="1"/>
+            <a:r>
+              <a:rPr lang="es-ES" dirty="0"/>
+              <a:t>Tres personajes seleccionables</a:t>
+            </a:r>
+          </a:p>
+          <a:p>
+            <a:pPr lvl="1"/>
+            <a:r>
+              <a:rPr lang="es-ES" dirty="0"/>
+              <a:t>Un enemigo “tonto”</a:t>
+            </a:r>
+          </a:p>
+          <a:p>
+            <a:pPr lvl="1"/>
+            <a:r>
+              <a:rPr lang="es-ES" dirty="0"/>
+              <a:t>Construcción de torretas</a:t>
+            </a:r>
+          </a:p>
+          <a:p>
+            <a:pPr lvl="1"/>
+            <a:r>
+              <a:rPr lang="es-ES" dirty="0"/>
+              <a:t>Arquitectura de mensajes</a:t>
+            </a:r>
+          </a:p>
+          <a:p>
+            <a:pPr lvl="1"/>
+            <a:r>
+              <a:rPr lang="es-ES" dirty="0"/>
+              <a:t>etc.</a:t>
+            </a:r>
+          </a:p>
+          <a:p>
+            <a:endParaRPr lang="es-ES" dirty="0"/>
+          </a:p>
+          <a:p>
+            <a:pPr marL="0" indent="0">
+              <a:buNone/>
+            </a:pPr>
+            <a:r>
+              <a:rPr lang="es-ES" dirty="0" smtClean="0"/>
+              <a:t>	Haciendo funcionalidad</a:t>
+            </a:r>
           </a:p>
         </p:txBody>
       </p:sp>
     </p:spTree>
     <p:extLst>
       <p:ext uri="{BB962C8B-B14F-4D97-AF65-F5344CB8AC3E}">
-        <p14:creationId xmlns:p14="http://schemas.microsoft.com/office/powerpoint/2010/main" val="302997466"/>
+        <p14:creationId xmlns:p14="http://schemas.microsoft.com/office/powerpoint/2010/main" val="1496572999"/>
       </p:ext>
     </p:extLst>
   </p:cSld>
   <p:clrMapOvr>
     <a:masterClrMapping/>
   </p:clrMapOvr>
+  <p:timing>
+    <p:tnLst>
+      <p:par>
+        <p:cTn id="1" dur="indefinite" restart="never" nodeType="tmRoot"/>
+      </p:par>
+    </p:tnLst>
+  </p:timing>
 </p:sld>
 </file>
 
@@ -2754,7 +3731,11 @@
           </a:bodyPr>
           <a:lstStyle/>
           <a:p>
-            <a:endParaRPr lang="es-ES"/>
+            <a:r>
+              <a:rPr lang="es-ES" dirty="0" smtClean="0"/>
+              <a:t>1. Introducción</a:t>
+            </a:r>
+            <a:endParaRPr lang="es-ES" dirty="0"/>
           </a:p>
         </p:txBody>
       </p:sp>
@@ -2797,20 +3778,73 @@
           <a:bodyPr/>
           <a:lstStyle/>
           <a:p>
-            <a:endParaRPr lang="es-ES"/>
+            <a:r>
+              <a:rPr lang="es-ES" dirty="0" smtClean="0"/>
+              <a:t>Objetivos hito 2</a:t>
+            </a:r>
+          </a:p>
+          <a:p>
+            <a:pPr lvl="1"/>
+            <a:r>
+              <a:rPr lang="es-ES" dirty="0" smtClean="0"/>
+              <a:t>Enemigos inteligentes: que nos ataquen</a:t>
+            </a:r>
+          </a:p>
+          <a:p>
+            <a:pPr lvl="1"/>
+            <a:r>
+              <a:rPr lang="es-ES" dirty="0" smtClean="0"/>
+              <a:t>Habilidades de los personajes</a:t>
+            </a:r>
+          </a:p>
+          <a:p>
+            <a:pPr lvl="1"/>
+            <a:r>
+              <a:rPr lang="es-ES" dirty="0" smtClean="0"/>
+              <a:t>Funcionalidad de edificios</a:t>
+            </a:r>
+          </a:p>
+          <a:p>
+            <a:pPr lvl="1"/>
+            <a:r>
+              <a:rPr lang="es-ES" dirty="0" smtClean="0"/>
+              <a:t>Editor de mapas</a:t>
+            </a:r>
+          </a:p>
+          <a:p>
+            <a:pPr marL="0" indent="0">
+              <a:buNone/>
+            </a:pPr>
+            <a:endParaRPr lang="es-ES" dirty="0"/>
+          </a:p>
+          <a:p>
+            <a:pPr marL="0" indent="0">
+              <a:buNone/>
+            </a:pPr>
+            <a:r>
+              <a:rPr lang="es-ES" dirty="0" smtClean="0"/>
+              <a:t>	Que se pudiera “jugar”</a:t>
+            </a:r>
           </a:p>
         </p:txBody>
       </p:sp>
     </p:spTree>
     <p:extLst>
       <p:ext uri="{BB962C8B-B14F-4D97-AF65-F5344CB8AC3E}">
-        <p14:creationId xmlns:p14="http://schemas.microsoft.com/office/powerpoint/2010/main" val="3901495484"/>
+        <p14:creationId xmlns:p14="http://schemas.microsoft.com/office/powerpoint/2010/main" val="4278571466"/>
       </p:ext>
     </p:extLst>
   </p:cSld>
   <p:clrMapOvr>
     <a:masterClrMapping/>
   </p:clrMapOvr>
+  <p:timing>
+    <p:tnLst>
+      <p:par>
+        <p:cTn id="1" dur="indefinite" restart="never" nodeType="tmRoot"/>
+      </p:par>
+    </p:tnLst>
+  </p:timing>
 </p:sld>
 </file>
 
@@ -2833,7 +3867,7 @@
       </p:grpSpPr>
       <p:sp>
         <p:nvSpPr>
-          <p:cNvPr id="2" name="1 Título"/>
+          <p:cNvPr id="5" name="4 Título"/>
           <p:cNvSpPr>
             <a:spLocks noGrp="1"/>
           </p:cNvSpPr>
@@ -2848,7 +3882,11 @@
           </a:bodyPr>
           <a:lstStyle/>
           <a:p>
-            <a:endParaRPr lang="es-ES"/>
+            <a:r>
+              <a:rPr lang="es-ES" dirty="0" smtClean="0"/>
+              <a:t>2. Desarrollo</a:t>
+            </a:r>
+            <a:endParaRPr lang="es-ES" dirty="0"/>
           </a:p>
         </p:txBody>
       </p:sp>
@@ -2919,8 +3957,34 @@
           <a:p>
             <a:r>
               <a:rPr lang="es-ES_tradnl" dirty="0" smtClean="0"/>
-              <a:t>Ataque de las torretas</a:t>
-            </a:r>
+              <a:t>Ataque de las </a:t>
+            </a:r>
+            <a:r>
+              <a:rPr lang="es-ES_tradnl" dirty="0" smtClean="0"/>
+              <a:t>torretas</a:t>
+            </a:r>
+          </a:p>
+          <a:p>
+            <a:r>
+              <a:rPr lang="es-ES_tradnl" dirty="0"/>
+              <a:t>Ataque de los </a:t>
+            </a:r>
+            <a:r>
+              <a:rPr lang="es-ES_tradnl" dirty="0" smtClean="0"/>
+              <a:t>enemigos</a:t>
+            </a:r>
+          </a:p>
+          <a:p>
+            <a:r>
+              <a:rPr lang="es-ES_tradnl" dirty="0"/>
+              <a:t>Habilidad de curación</a:t>
+            </a:r>
+          </a:p>
+          <a:p>
+            <a:endParaRPr lang="es-ES_tradnl" dirty="0"/>
+          </a:p>
+          <a:p>
+            <a:endParaRPr lang="es-ES_tradnl" dirty="0" smtClean="0"/>
           </a:p>
           <a:p>
             <a:pPr marL="0" indent="0">
@@ -2932,36 +3996,6 @@
             <a:pPr marL="0" indent="0">
               <a:buNone/>
             </a:pPr>
-            <a:endParaRPr lang="es-ES" dirty="0"/>
-          </a:p>
-        </p:txBody>
-      </p:sp>
-      <p:sp>
-        <p:nvSpPr>
-          <p:cNvPr id="6" name="5 CuadroTexto"/>
-          <p:cNvSpPr txBox="1"/>
-          <p:nvPr/>
-        </p:nvSpPr>
-        <p:spPr>
-          <a:xfrm>
-            <a:off x="4957408" y="4399184"/>
-            <a:ext cx="1728192" cy="646331"/>
-          </a:xfrm>
-          <a:prstGeom prst="rect">
-            <a:avLst/>
-          </a:prstGeom>
-          <a:noFill/>
-        </p:spPr>
-        <p:txBody>
-          <a:bodyPr wrap="square" rtlCol="0">
-            <a:spAutoFit/>
-          </a:bodyPr>
-          <a:lstStyle/>
-          <a:p>
-            <a:r>
-              <a:rPr lang="es-ES_tradnl" dirty="0" smtClean="0"/>
-              <a:t>Vídeo de ataque de torretas</a:t>
-            </a:r>
             <a:endParaRPr lang="es-ES" dirty="0"/>
           </a:p>
         </p:txBody>
@@ -3020,7 +4054,11 @@
           </a:bodyPr>
           <a:lstStyle/>
           <a:p>
-            <a:endParaRPr lang="es-ES"/>
+            <a:r>
+              <a:rPr lang="es-ES" dirty="0" smtClean="0"/>
+              <a:t>2. Desarrollo</a:t>
+            </a:r>
+            <a:endParaRPr lang="es-ES" dirty="0"/>
           </a:p>
         </p:txBody>
       </p:sp>
@@ -3064,124 +4102,8 @@
           <a:lstStyle/>
           <a:p>
             <a:r>
-              <a:rPr lang="es-ES_tradnl" dirty="0" smtClean="0"/>
-              <a:t>Ataque de los enemigos</a:t>
-            </a:r>
-          </a:p>
-          <a:p>
-            <a:endParaRPr lang="es-ES_tradnl" dirty="0" smtClean="0"/>
-          </a:p>
-          <a:p>
-            <a:r>
-              <a:rPr lang="es-ES_tradnl" dirty="0" smtClean="0"/>
-              <a:t>Habilidad de curación</a:t>
-            </a:r>
-          </a:p>
-          <a:p>
-            <a:endParaRPr lang="es-ES_tradnl" dirty="0"/>
-          </a:p>
-          <a:p>
-            <a:endParaRPr lang="es-ES_tradnl" dirty="0"/>
-          </a:p>
-          <a:p>
-            <a:pPr marL="0" indent="0">
-              <a:buNone/>
-            </a:pPr>
-            <a:endParaRPr lang="es-ES_tradnl" dirty="0" smtClean="0"/>
-          </a:p>
-          <a:p>
-            <a:pPr marL="0" indent="0">
-              <a:buNone/>
-            </a:pPr>
-            <a:endParaRPr lang="es-ES_tradnl" dirty="0"/>
-          </a:p>
-          <a:p>
-            <a:pPr marL="0" indent="0">
-              <a:buNone/>
-            </a:pPr>
-            <a:endParaRPr lang="es-ES_tradnl" dirty="0" smtClean="0"/>
-          </a:p>
-          <a:p>
-            <a:pPr marL="0" indent="0">
-              <a:buNone/>
-            </a:pPr>
-            <a:endParaRPr lang="es-ES_tradnl" dirty="0" smtClean="0"/>
-          </a:p>
-          <a:p>
-            <a:pPr marL="0" indent="0">
-              <a:buNone/>
-            </a:pPr>
-            <a:endParaRPr lang="es-ES_tradnl" dirty="0" smtClean="0"/>
-          </a:p>
-          <a:p>
-            <a:pPr marL="0" indent="0">
-              <a:buNone/>
-            </a:pPr>
-            <a:endParaRPr lang="es-ES_tradnl" dirty="0"/>
-          </a:p>
-          <a:p>
-            <a:pPr marL="0" indent="0">
-              <a:buNone/>
-            </a:pPr>
-            <a:endParaRPr lang="es-ES" dirty="0"/>
-          </a:p>
-        </p:txBody>
-      </p:sp>
-      <p:sp>
-        <p:nvSpPr>
-          <p:cNvPr id="6" name="5 CuadroTexto"/>
-          <p:cNvSpPr txBox="1"/>
-          <p:nvPr/>
-        </p:nvSpPr>
-        <p:spPr>
-          <a:xfrm>
-            <a:off x="3059832" y="2295136"/>
-            <a:ext cx="1728192" cy="646331"/>
-          </a:xfrm>
-          <a:prstGeom prst="rect">
-            <a:avLst/>
-          </a:prstGeom>
-          <a:noFill/>
-        </p:spPr>
-        <p:txBody>
-          <a:bodyPr wrap="square" rtlCol="0">
-            <a:spAutoFit/>
-          </a:bodyPr>
-          <a:lstStyle/>
-          <a:p>
-            <a:r>
-              <a:rPr lang="es-ES_tradnl" dirty="0" smtClean="0"/>
-              <a:t>Vídeo de ataque de enemigos</a:t>
-            </a:r>
-            <a:endParaRPr lang="es-ES" dirty="0"/>
-          </a:p>
-        </p:txBody>
-      </p:sp>
-      <p:sp>
-        <p:nvSpPr>
-          <p:cNvPr id="7" name="6 CuadroTexto"/>
-          <p:cNvSpPr txBox="1"/>
-          <p:nvPr/>
-        </p:nvSpPr>
-        <p:spPr>
-          <a:xfrm>
-            <a:off x="3143408" y="3204600"/>
-            <a:ext cx="2940760" cy="369332"/>
-          </a:xfrm>
-          <a:prstGeom prst="rect">
-            <a:avLst/>
-          </a:prstGeom>
-          <a:noFill/>
-        </p:spPr>
-        <p:txBody>
-          <a:bodyPr wrap="square" rtlCol="0">
-            <a:spAutoFit/>
-          </a:bodyPr>
-          <a:lstStyle/>
-          <a:p>
-            <a:r>
-              <a:rPr lang="es-ES_tradnl" dirty="0" smtClean="0"/>
-              <a:t>Vídeo de curación</a:t>
+              <a:rPr lang="es-ES" dirty="0" smtClean="0"/>
+              <a:t>Aquí vídeo de ataque de las torretas</a:t>
             </a:r>
             <a:endParaRPr lang="es-ES" dirty="0"/>
           </a:p>
@@ -3190,7 +4112,7 @@
     </p:spTree>
     <p:extLst>
       <p:ext uri="{BB962C8B-B14F-4D97-AF65-F5344CB8AC3E}">
-        <p14:creationId xmlns:p14="http://schemas.microsoft.com/office/powerpoint/2010/main" val="3663854183"/>
+        <p14:creationId xmlns:p14="http://schemas.microsoft.com/office/powerpoint/2010/main" val="2108186419"/>
       </p:ext>
     </p:extLst>
   </p:cSld>
@@ -3242,8 +4164,8 @@
           <a:lstStyle/>
           <a:p>
             <a:r>
-              <a:rPr lang="es-ES_tradnl" dirty="0" smtClean="0"/>
-              <a:t>Cambios</a:t>
+              <a:rPr lang="es-ES" dirty="0" smtClean="0"/>
+              <a:t>2. Desarrollo</a:t>
             </a:r>
             <a:endParaRPr lang="es-ES" dirty="0"/>
           </a:p>
@@ -3288,6 +4210,10 @@
           <a:bodyPr/>
           <a:lstStyle/>
           <a:p>
+            <a:r>
+              <a:rPr lang="es-ES" dirty="0" smtClean="0"/>
+              <a:t>Aquí vídeo de ataque de los enemigos</a:t>
+            </a:r>
             <a:endParaRPr lang="es-ES" dirty="0"/>
           </a:p>
         </p:txBody>
@@ -3295,13 +4221,20 @@
     </p:spTree>
     <p:extLst>
       <p:ext uri="{BB962C8B-B14F-4D97-AF65-F5344CB8AC3E}">
-        <p14:creationId xmlns:p14="http://schemas.microsoft.com/office/powerpoint/2010/main" val="3092550454"/>
+        <p14:creationId xmlns:p14="http://schemas.microsoft.com/office/powerpoint/2010/main" val="4038242327"/>
       </p:ext>
     </p:extLst>
   </p:cSld>
   <p:clrMapOvr>
     <a:masterClrMapping/>
   </p:clrMapOvr>
+  <p:timing>
+    <p:tnLst>
+      <p:par>
+        <p:cTn id="1" dur="indefinite" restart="never" nodeType="tmRoot"/>
+      </p:par>
+    </p:tnLst>
+  </p:timing>
 </p:sld>
 </file>
 
@@ -3339,7 +4272,11 @@
           </a:bodyPr>
           <a:lstStyle/>
           <a:p>
-            <a:endParaRPr lang="es-ES"/>
+            <a:r>
+              <a:rPr lang="es-ES" dirty="0" smtClean="0"/>
+              <a:t>2. Desarrollo</a:t>
+            </a:r>
+            <a:endParaRPr lang="es-ES" dirty="0"/>
           </a:p>
         </p:txBody>
       </p:sp>
@@ -3382,20 +4319,297 @@
           <a:bodyPr/>
           <a:lstStyle/>
           <a:p>
-            <a:endParaRPr lang="es-ES"/>
+            <a:r>
+              <a:rPr lang="es-ES" dirty="0" smtClean="0"/>
+              <a:t>Aquí vídeo de curación</a:t>
+            </a:r>
+            <a:endParaRPr lang="es-ES" dirty="0"/>
           </a:p>
         </p:txBody>
       </p:sp>
     </p:spTree>
     <p:extLst>
       <p:ext uri="{BB962C8B-B14F-4D97-AF65-F5344CB8AC3E}">
-        <p14:creationId xmlns:p14="http://schemas.microsoft.com/office/powerpoint/2010/main" val="133605616"/>
+        <p14:creationId xmlns:p14="http://schemas.microsoft.com/office/powerpoint/2010/main" val="2301363484"/>
       </p:ext>
     </p:extLst>
   </p:cSld>
   <p:clrMapOvr>
     <a:masterClrMapping/>
   </p:clrMapOvr>
+  <p:timing>
+    <p:tnLst>
+      <p:par>
+        <p:cTn id="1" dur="indefinite" restart="never" nodeType="tmRoot"/>
+      </p:par>
+    </p:tnLst>
+  </p:timing>
+</p:sld>
+</file>
+
+<file path=ppt/slides/slide8.xml><?xml version="1.0" encoding="utf-8"?>
+<p:sld xmlns:a="http://schemas.openxmlformats.org/drawingml/2006/main" xmlns:r="http://schemas.openxmlformats.org/officeDocument/2006/relationships" xmlns:p="http://schemas.openxmlformats.org/presentationml/2006/main">
+  <p:cSld>
+    <p:spTree>
+      <p:nvGrpSpPr>
+        <p:cNvPr id="1" name=""/>
+        <p:cNvGrpSpPr/>
+        <p:nvPr/>
+      </p:nvGrpSpPr>
+      <p:grpSpPr>
+        <a:xfrm>
+          <a:off x="0" y="0"/>
+          <a:ext cx="0" cy="0"/>
+          <a:chOff x="0" y="0"/>
+          <a:chExt cx="0" cy="0"/>
+        </a:xfrm>
+      </p:grpSpPr>
+      <p:sp>
+        <p:nvSpPr>
+          <p:cNvPr id="2" name="1 Título"/>
+          <p:cNvSpPr>
+            <a:spLocks noGrp="1"/>
+          </p:cNvSpPr>
+          <p:nvPr>
+            <p:ph type="title"/>
+          </p:nvPr>
+        </p:nvSpPr>
+        <p:spPr/>
+        <p:txBody>
+          <a:bodyPr>
+            <a:normAutofit fontScale="90000"/>
+          </a:bodyPr>
+          <a:lstStyle/>
+          <a:p>
+            <a:r>
+              <a:rPr lang="es-ES" dirty="0" smtClean="0"/>
+              <a:t>2. Desarrollo</a:t>
+            </a:r>
+            <a:endParaRPr lang="es-ES" dirty="0"/>
+          </a:p>
+        </p:txBody>
+      </p:sp>
+      <p:sp>
+        <p:nvSpPr>
+          <p:cNvPr id="3" name="2 Marcador de número de diapositiva"/>
+          <p:cNvSpPr>
+            <a:spLocks noGrp="1"/>
+          </p:cNvSpPr>
+          <p:nvPr>
+            <p:ph type="sldNum" sz="quarter" idx="10"/>
+          </p:nvPr>
+        </p:nvSpPr>
+        <p:spPr/>
+        <p:txBody>
+          <a:bodyPr/>
+          <a:lstStyle/>
+          <a:p>
+            <a:fld id="{95CB376A-28C7-43B8-86A8-A747AD281D25}" type="slidenum">
+              <a:rPr lang="es-ES" smtClean="0"/>
+              <a:pPr/>
+              <a:t>7</a:t>
+            </a:fld>
+            <a:endParaRPr lang="es-ES" dirty="0"/>
+          </a:p>
+        </p:txBody>
+      </p:sp>
+      <p:sp>
+        <p:nvSpPr>
+          <p:cNvPr id="4" name="3 Marcador de contenido"/>
+          <p:cNvSpPr>
+            <a:spLocks noGrp="1"/>
+          </p:cNvSpPr>
+          <p:nvPr>
+            <p:ph idx="1"/>
+          </p:nvPr>
+        </p:nvSpPr>
+        <p:spPr/>
+        <p:txBody>
+          <a:bodyPr/>
+          <a:lstStyle/>
+          <a:p>
+            <a:r>
+              <a:rPr lang="es-ES" dirty="0" smtClean="0"/>
+              <a:t>Algunas mejoras de arquitectura</a:t>
+            </a:r>
+          </a:p>
+          <a:p>
+            <a:pPr lvl="1"/>
+            <a:r>
+              <a:rPr lang="es-ES" dirty="0" smtClean="0"/>
+              <a:t>Cronómetro</a:t>
+            </a:r>
+          </a:p>
+          <a:p>
+            <a:pPr lvl="1"/>
+            <a:r>
+              <a:rPr lang="es-ES" dirty="0" smtClean="0"/>
+              <a:t>Integración de </a:t>
+            </a:r>
+            <a:r>
+              <a:rPr lang="es-ES" dirty="0" err="1" smtClean="0"/>
+              <a:t>lua</a:t>
+            </a:r>
+            <a:endParaRPr lang="es-ES" dirty="0" smtClean="0"/>
+          </a:p>
+          <a:p>
+            <a:pPr lvl="1"/>
+            <a:r>
+              <a:rPr lang="es-ES" dirty="0" err="1" smtClean="0"/>
+              <a:t>Parseador</a:t>
+            </a:r>
+            <a:r>
+              <a:rPr lang="es-ES" dirty="0" smtClean="0"/>
+              <a:t> de mapas en </a:t>
+            </a:r>
+            <a:r>
+              <a:rPr lang="es-ES" dirty="0" err="1" smtClean="0"/>
+              <a:t>lua</a:t>
+            </a:r>
+            <a:endParaRPr lang="es-ES" dirty="0" smtClean="0"/>
+          </a:p>
+          <a:p>
+            <a:r>
+              <a:rPr lang="es-ES" dirty="0" smtClean="0"/>
+              <a:t>Y herramientas</a:t>
+            </a:r>
+          </a:p>
+          <a:p>
+            <a:pPr lvl="1"/>
+            <a:r>
+              <a:rPr lang="es-ES" dirty="0" smtClean="0"/>
+              <a:t>Editor de mapas en Java</a:t>
+            </a:r>
+            <a:endParaRPr lang="es-ES" dirty="0"/>
+          </a:p>
+        </p:txBody>
+      </p:sp>
+    </p:spTree>
+    <p:extLst>
+      <p:ext uri="{BB962C8B-B14F-4D97-AF65-F5344CB8AC3E}">
+        <p14:creationId xmlns:p14="http://schemas.microsoft.com/office/powerpoint/2010/main" val="3197139637"/>
+      </p:ext>
+    </p:extLst>
+  </p:cSld>
+  <p:clrMapOvr>
+    <a:masterClrMapping/>
+  </p:clrMapOvr>
+  <p:timing>
+    <p:tnLst>
+      <p:par>
+        <p:cTn id="1" dur="indefinite" restart="never" nodeType="tmRoot"/>
+      </p:par>
+    </p:tnLst>
+  </p:timing>
+</p:sld>
+</file>
+
+<file path=ppt/slides/slide9.xml><?xml version="1.0" encoding="utf-8"?>
+<p:sld xmlns:a="http://schemas.openxmlformats.org/drawingml/2006/main" xmlns:r="http://schemas.openxmlformats.org/officeDocument/2006/relationships" xmlns:p="http://schemas.openxmlformats.org/presentationml/2006/main">
+  <p:cSld>
+    <p:spTree>
+      <p:nvGrpSpPr>
+        <p:cNvPr id="1" name=""/>
+        <p:cNvGrpSpPr/>
+        <p:nvPr/>
+      </p:nvGrpSpPr>
+      <p:grpSpPr>
+        <a:xfrm>
+          <a:off x="0" y="0"/>
+          <a:ext cx="0" cy="0"/>
+          <a:chOff x="0" y="0"/>
+          <a:chExt cx="0" cy="0"/>
+        </a:xfrm>
+      </p:grpSpPr>
+      <p:sp>
+        <p:nvSpPr>
+          <p:cNvPr id="2" name="1 Título"/>
+          <p:cNvSpPr>
+            <a:spLocks noGrp="1"/>
+          </p:cNvSpPr>
+          <p:nvPr>
+            <p:ph type="title"/>
+          </p:nvPr>
+        </p:nvSpPr>
+        <p:spPr/>
+        <p:txBody>
+          <a:bodyPr>
+            <a:normAutofit fontScale="90000"/>
+          </a:bodyPr>
+          <a:lstStyle/>
+          <a:p>
+            <a:r>
+              <a:rPr lang="es-ES" dirty="0" smtClean="0"/>
+              <a:t>2. Desarrollo</a:t>
+            </a:r>
+            <a:endParaRPr lang="es-ES" dirty="0"/>
+          </a:p>
+        </p:txBody>
+      </p:sp>
+      <p:sp>
+        <p:nvSpPr>
+          <p:cNvPr id="3" name="2 Marcador de número de diapositiva"/>
+          <p:cNvSpPr>
+            <a:spLocks noGrp="1"/>
+          </p:cNvSpPr>
+          <p:nvPr>
+            <p:ph type="sldNum" sz="quarter" idx="10"/>
+          </p:nvPr>
+        </p:nvSpPr>
+        <p:spPr/>
+        <p:txBody>
+          <a:bodyPr/>
+          <a:lstStyle/>
+          <a:p>
+            <a:fld id="{95CB376A-28C7-43B8-86A8-A747AD281D25}" type="slidenum">
+              <a:rPr lang="es-ES" smtClean="0"/>
+              <a:pPr/>
+              <a:t>8</a:t>
+            </a:fld>
+            <a:endParaRPr lang="es-ES" dirty="0"/>
+          </a:p>
+        </p:txBody>
+      </p:sp>
+      <p:sp>
+        <p:nvSpPr>
+          <p:cNvPr id="4" name="3 Marcador de contenido"/>
+          <p:cNvSpPr>
+            <a:spLocks noGrp="1"/>
+          </p:cNvSpPr>
+          <p:nvPr>
+            <p:ph idx="1"/>
+          </p:nvPr>
+        </p:nvSpPr>
+        <p:spPr/>
+        <p:txBody>
+          <a:bodyPr/>
+          <a:lstStyle/>
+          <a:p>
+            <a:r>
+              <a:rPr lang="es-ES" dirty="0" smtClean="0"/>
+              <a:t>Aquí vídeo del editor y de la carga del mapa en el juego</a:t>
+            </a:r>
+            <a:endParaRPr lang="es-ES" dirty="0"/>
+          </a:p>
+        </p:txBody>
+      </p:sp>
+    </p:spTree>
+    <p:extLst>
+      <p:ext uri="{BB962C8B-B14F-4D97-AF65-F5344CB8AC3E}">
+        <p14:creationId xmlns:p14="http://schemas.microsoft.com/office/powerpoint/2010/main" val="1237790679"/>
+      </p:ext>
+    </p:extLst>
+  </p:cSld>
+  <p:clrMapOvr>
+    <a:masterClrMapping/>
+  </p:clrMapOvr>
+  <p:timing>
+    <p:tnLst>
+      <p:par>
+        <p:cTn id="1" dur="indefinite" restart="never" nodeType="tmRoot"/>
+      </p:par>
+    </p:tnLst>
+  </p:timing>
 </p:sld>
 </file>
 

</xml_diff>

<commit_message>
Añadida mi presentación del hito 2
git-svn-id: http://mastervj.fdi.ucm.es/svn/master/grupo3/trunk@1325 afcbbe0f-131b-4dd2-a684-3ccf32d4d6de
</commit_message>
<xml_diff>
--- a/Hitos/Presentacion hito 2.pptx
+++ b/Hitos/Presentacion hito 2.pptx
@@ -5,7 +5,7 @@
     <p:sldMasterId id="2147483648" r:id="rId1"/>
   </p:sldMasterIdLst>
   <p:notesMasterIdLst>
-    <p:notesMasterId r:id="rId18"/>
+    <p:notesMasterId r:id="rId20"/>
   </p:notesMasterIdLst>
   <p:sldIdLst>
     <p:sldId id="256" r:id="rId2"/>
@@ -17,13 +17,15 @@
     <p:sldId id="268" r:id="rId8"/>
     <p:sldId id="278" r:id="rId9"/>
     <p:sldId id="279" r:id="rId10"/>
-    <p:sldId id="271" r:id="rId11"/>
-    <p:sldId id="272" r:id="rId12"/>
-    <p:sldId id="273" r:id="rId13"/>
-    <p:sldId id="274" r:id="rId14"/>
-    <p:sldId id="275" r:id="rId15"/>
-    <p:sldId id="276" r:id="rId16"/>
-    <p:sldId id="277" r:id="rId17"/>
+    <p:sldId id="280" r:id="rId11"/>
+    <p:sldId id="281" r:id="rId12"/>
+    <p:sldId id="271" r:id="rId13"/>
+    <p:sldId id="272" r:id="rId14"/>
+    <p:sldId id="273" r:id="rId15"/>
+    <p:sldId id="274" r:id="rId16"/>
+    <p:sldId id="275" r:id="rId17"/>
+    <p:sldId id="276" r:id="rId18"/>
+    <p:sldId id="277" r:id="rId19"/>
   </p:sldIdLst>
   <p:sldSz cx="9144000" cy="6858000" type="screen4x3"/>
   <p:notesSz cx="6858000" cy="9144000"/>
@@ -207,6 +209,7 @@
           <a:p>
             <a:fld id="{A6E99F27-1136-4DE7-900F-DCB936136CCB}" type="datetimeFigureOut">
               <a:rPr lang="es-ES" smtClean="0"/>
+              <a:pPr/>
               <a:t>16/03/2012</a:t>
             </a:fld>
             <a:endParaRPr lang="es-ES"/>
@@ -366,6 +369,7 @@
           <a:p>
             <a:fld id="{70C24321-836C-4686-A6B9-C39FE142EA89}" type="slidenum">
               <a:rPr lang="es-ES" smtClean="0"/>
+              <a:pPr/>
               <a:t>‹Nº›</a:t>
             </a:fld>
             <a:endParaRPr lang="es-ES"/>
@@ -375,7 +379,7 @@
     </p:spTree>
     <p:extLst>
       <p:ext uri="{BB962C8B-B14F-4D97-AF65-F5344CB8AC3E}">
-        <p14:creationId xmlns:p14="http://schemas.microsoft.com/office/powerpoint/2010/main" val="1318256401"/>
+        <p14:creationId xmlns:p14="http://schemas.microsoft.com/office/powerpoint/2010/main" xmlns="" val="1318256401"/>
       </p:ext>
     </p:extLst>
   </p:cSld>
@@ -567,7 +571,7 @@
     </p:spTree>
     <p:extLst>
       <p:ext uri="{BB962C8B-B14F-4D97-AF65-F5344CB8AC3E}">
-        <p14:creationId xmlns:p14="http://schemas.microsoft.com/office/powerpoint/2010/main" val="258938423"/>
+        <p14:creationId xmlns:p14="http://schemas.microsoft.com/office/powerpoint/2010/main" xmlns="" val="258938423"/>
       </p:ext>
     </p:extLst>
   </p:cSld>
@@ -781,7 +785,7 @@
     </p:spTree>
     <p:extLst>
       <p:ext uri="{BB962C8B-B14F-4D97-AF65-F5344CB8AC3E}">
-        <p14:creationId xmlns:p14="http://schemas.microsoft.com/office/powerpoint/2010/main" val="2169588664"/>
+        <p14:creationId xmlns:p14="http://schemas.microsoft.com/office/powerpoint/2010/main" xmlns="" val="2169588664"/>
       </p:ext>
     </p:extLst>
   </p:cSld>
@@ -991,7 +995,7 @@
     </p:spTree>
     <p:extLst>
       <p:ext uri="{BB962C8B-B14F-4D97-AF65-F5344CB8AC3E}">
-        <p14:creationId xmlns:p14="http://schemas.microsoft.com/office/powerpoint/2010/main" val="2085816045"/>
+        <p14:creationId xmlns:p14="http://schemas.microsoft.com/office/powerpoint/2010/main" xmlns="" val="2085816045"/>
       </p:ext>
     </p:extLst>
   </p:cSld>
@@ -1179,7 +1183,7 @@
     </p:spTree>
     <p:extLst>
       <p:ext uri="{BB962C8B-B14F-4D97-AF65-F5344CB8AC3E}">
-        <p14:creationId xmlns:p14="http://schemas.microsoft.com/office/powerpoint/2010/main" val="2476014489"/>
+        <p14:creationId xmlns:p14="http://schemas.microsoft.com/office/powerpoint/2010/main" xmlns="" val="2476014489"/>
       </p:ext>
     </p:extLst>
   </p:cSld>
@@ -1385,7 +1389,7 @@
     </p:spTree>
     <p:extLst>
       <p:ext uri="{BB962C8B-B14F-4D97-AF65-F5344CB8AC3E}">
-        <p14:creationId xmlns:p14="http://schemas.microsoft.com/office/powerpoint/2010/main" val="2354511853"/>
+        <p14:creationId xmlns:p14="http://schemas.microsoft.com/office/powerpoint/2010/main" xmlns="" val="2354511853"/>
       </p:ext>
     </p:extLst>
   </p:cSld>
@@ -1457,10 +1461,10 @@
           <p:nvPr userDrawn="1"/>
         </p:nvPicPr>
         <p:blipFill>
-          <a:blip r:embed="rId7">
+          <a:blip r:embed="rId7" cstate="print">
             <a:extLst>
               <a:ext uri="{BEBA8EAE-BF5A-486C-A8C5-ECC9F3942E4B}">
-                <a14:imgProps xmlns:a14="http://schemas.microsoft.com/office/drawing/2010/main">
+                <a14:imgProps xmlns:a14="http://schemas.microsoft.com/office/drawing/2010/main" xmlns="">
                   <a14:imgLayer r:embed="rId8">
                     <a14:imgEffect>
                       <a14:sharpenSoften amount="-25000"/>
@@ -1469,7 +1473,7 @@
                 </a14:imgProps>
               </a:ext>
               <a:ext uri="{28A0092B-C50C-407E-A947-70E740481C1C}">
-                <a14:useLocalDpi xmlns:a14="http://schemas.microsoft.com/office/drawing/2010/main" val="0"/>
+                <a14:useLocalDpi xmlns:a14="http://schemas.microsoft.com/office/drawing/2010/main" xmlns="" val="0"/>
               </a:ext>
             </a:extLst>
           </a:blip>
@@ -2099,7 +2103,7 @@
     </p:spTree>
     <p:extLst>
       <p:ext uri="{BB962C8B-B14F-4D97-AF65-F5344CB8AC3E}">
-        <p14:creationId xmlns:p14="http://schemas.microsoft.com/office/powerpoint/2010/main" val="724215502"/>
+        <p14:creationId xmlns:p14="http://schemas.microsoft.com/office/powerpoint/2010/main" xmlns="" val="724215502"/>
       </p:ext>
     </p:extLst>
   </p:cSld>
@@ -2439,7 +2443,7 @@
     </p:spTree>
     <p:extLst>
       <p:ext uri="{BB962C8B-B14F-4D97-AF65-F5344CB8AC3E}">
-        <p14:creationId xmlns:p14="http://schemas.microsoft.com/office/powerpoint/2010/main" val="3431410413"/>
+        <p14:creationId xmlns:p14="http://schemas.microsoft.com/office/powerpoint/2010/main" xmlns="" val="3431410413"/>
       </p:ext>
     </p:extLst>
   </p:cSld>
@@ -2492,7 +2496,7 @@
           <a:p>
             <a:r>
               <a:rPr lang="es-ES" dirty="0" smtClean="0"/>
-              <a:t>3. Valoración final</a:t>
+              <a:t>2. Desarrollo</a:t>
             </a:r>
             <a:endParaRPr lang="es-ES" dirty="0"/>
           </a:p>
@@ -2534,83 +2538,53 @@
         </p:nvSpPr>
         <p:spPr/>
         <p:txBody>
-          <a:bodyPr>
-            <a:normAutofit lnSpcReduction="10000"/>
-          </a:bodyPr>
-          <a:lstStyle/>
-          <a:p>
-            <a:r>
-              <a:rPr lang="es-ES" dirty="0" smtClean="0"/>
-              <a:t>Lo que tenemos</a:t>
-            </a:r>
+          <a:bodyPr/>
+          <a:lstStyle/>
+          <a:p>
+            <a:r>
+              <a:rPr lang="es-ES" dirty="0" smtClean="0"/>
+              <a:t>Activación y desactivación de componentes</a:t>
+            </a:r>
+          </a:p>
+          <a:p>
+            <a:r>
+              <a:rPr lang="es-ES" dirty="0" smtClean="0"/>
+              <a:t>Mejorados ciertos aspectos de la arquitectura</a:t>
+            </a:r>
+            <a:endParaRPr lang="es-ES" dirty="0" smtClean="0"/>
           </a:p>
           <a:p>
             <a:pPr lvl="1"/>
             <a:r>
               <a:rPr lang="es-ES" dirty="0" smtClean="0"/>
-              <a:t>Una torreta con funcionalidad</a:t>
-            </a:r>
+              <a:t>Gestión de los </a:t>
+            </a:r>
+            <a:r>
+              <a:rPr lang="es-ES" dirty="0" err="1" smtClean="0"/>
+              <a:t>billboards</a:t>
+            </a:r>
+            <a:endParaRPr lang="es-ES" dirty="0" smtClean="0"/>
           </a:p>
           <a:p>
             <a:pPr lvl="1"/>
             <a:r>
               <a:rPr lang="es-ES" dirty="0" smtClean="0"/>
-              <a:t>Enemigos que nos atacan: inteligentes</a:t>
-            </a:r>
+              <a:t>Selección de jugadores unificada</a:t>
+            </a:r>
+            <a:endParaRPr lang="es-ES" dirty="0" smtClean="0"/>
+          </a:p>
+          <a:p>
+            <a:r>
+              <a:rPr lang="es-ES" dirty="0" smtClean="0"/>
+              <a:t>Otra habilidad</a:t>
+            </a:r>
+            <a:endParaRPr lang="es-ES" dirty="0" smtClean="0"/>
           </a:p>
           <a:p>
             <a:pPr lvl="1"/>
             <a:r>
               <a:rPr lang="es-ES" dirty="0" smtClean="0"/>
-              <a:t>Habilidades para curarnos y atacar</a:t>
-            </a:r>
-          </a:p>
-          <a:p>
-            <a:pPr lvl="1"/>
-            <a:r>
-              <a:rPr lang="es-ES" dirty="0" smtClean="0"/>
-              <a:t>Editor de mapas terminado</a:t>
-            </a:r>
-          </a:p>
-          <a:p>
-            <a:pPr lvl="1"/>
-            <a:r>
-              <a:rPr lang="es-ES" dirty="0" smtClean="0"/>
-              <a:t>Extras:</a:t>
-            </a:r>
-          </a:p>
-          <a:p>
-            <a:pPr lvl="2"/>
-            <a:r>
-              <a:rPr lang="es-ES" dirty="0" smtClean="0"/>
-              <a:t>Pintado de la física</a:t>
-            </a:r>
-          </a:p>
-          <a:p>
-            <a:pPr lvl="2"/>
-            <a:r>
-              <a:rPr lang="es-ES" dirty="0" smtClean="0"/>
-              <a:t>Integración de </a:t>
-            </a:r>
-            <a:r>
-              <a:rPr lang="es-ES" dirty="0" err="1" smtClean="0"/>
-              <a:t>lua</a:t>
-            </a:r>
-            <a:endParaRPr lang="es-ES" dirty="0" smtClean="0"/>
-          </a:p>
-          <a:p>
-            <a:pPr lvl="2"/>
-            <a:r>
-              <a:rPr lang="es-ES" dirty="0" err="1" smtClean="0"/>
-              <a:t>Parseador</a:t>
-            </a:r>
-            <a:r>
-              <a:rPr lang="es-ES" dirty="0" smtClean="0"/>
-              <a:t> de mapas en </a:t>
-            </a:r>
-            <a:r>
-              <a:rPr lang="es-ES" dirty="0" err="1" smtClean="0"/>
-              <a:t>lua</a:t>
+              <a:t>Lanzar granada</a:t>
             </a:r>
             <a:endParaRPr lang="es-ES" dirty="0"/>
           </a:p>
@@ -2619,7 +2593,7 @@
     </p:spTree>
     <p:extLst>
       <p:ext uri="{BB962C8B-B14F-4D97-AF65-F5344CB8AC3E}">
-        <p14:creationId xmlns:p14="http://schemas.microsoft.com/office/powerpoint/2010/main" val="3830420791"/>
+        <p14:creationId xmlns:p14="http://schemas.microsoft.com/office/powerpoint/2010/main" xmlns="" val="3197139637"/>
       </p:ext>
     </p:extLst>
   </p:cSld>
@@ -2672,7 +2646,7 @@
           <a:p>
             <a:r>
               <a:rPr lang="es-ES" dirty="0" smtClean="0"/>
-              <a:t>3. Valoración final</a:t>
+              <a:t>2. Desarrollo</a:t>
             </a:r>
             <a:endParaRPr lang="es-ES" dirty="0"/>
           </a:p>
@@ -2719,35 +2693,11 @@
           <a:p>
             <a:r>
               <a:rPr lang="es-ES" dirty="0" smtClean="0"/>
-              <a:t>Conclusión</a:t>
-            </a:r>
-          </a:p>
-          <a:p>
-            <a:pPr lvl="1"/>
-            <a:r>
-              <a:rPr lang="es-ES" dirty="0" smtClean="0"/>
-              <a:t>Buen ritmo de trabajo, al igual que en el hito 1</a:t>
-            </a:r>
-          </a:p>
-          <a:p>
-            <a:pPr lvl="1"/>
-            <a:r>
-              <a:rPr lang="es-ES" dirty="0" smtClean="0"/>
-              <a:t>Mas arquitectura que funcionalidad</a:t>
-            </a:r>
-          </a:p>
-          <a:p>
-            <a:pPr lvl="1"/>
-            <a:r>
-              <a:rPr lang="es-ES" dirty="0" smtClean="0"/>
-              <a:t>Por tanto menos resultado visual</a:t>
-            </a:r>
-          </a:p>
-          <a:p>
-            <a:pPr lvl="1"/>
-            <a:r>
-              <a:rPr lang="es-ES" dirty="0" smtClean="0"/>
-              <a:t>Pero…</a:t>
+              <a:t>Aquí vídeo </a:t>
+            </a:r>
+            <a:r>
+              <a:rPr lang="es-ES" dirty="0" smtClean="0"/>
+              <a:t>del personaje lanzando una granada</a:t>
             </a:r>
             <a:endParaRPr lang="es-ES" dirty="0"/>
           </a:p>
@@ -2756,7 +2706,7 @@
     </p:spTree>
     <p:extLst>
       <p:ext uri="{BB962C8B-B14F-4D97-AF65-F5344CB8AC3E}">
-        <p14:creationId xmlns:p14="http://schemas.microsoft.com/office/powerpoint/2010/main" val="3976005005"/>
+        <p14:creationId xmlns:p14="http://schemas.microsoft.com/office/powerpoint/2010/main" xmlns="" val="1237790679"/>
       </p:ext>
     </p:extLst>
   </p:cSld>
@@ -2851,48 +2801,83 @@
         </p:nvSpPr>
         <p:spPr/>
         <p:txBody>
-          <a:bodyPr/>
-          <a:lstStyle/>
-          <a:p>
-            <a:r>
-              <a:rPr lang="es-ES" dirty="0" smtClean="0"/>
-              <a:t>¡</a:t>
+          <a:bodyPr>
+            <a:normAutofit lnSpcReduction="10000"/>
+          </a:bodyPr>
+          <a:lstStyle/>
+          <a:p>
+            <a:r>
+              <a:rPr lang="es-ES" dirty="0" smtClean="0"/>
+              <a:t>Lo que tenemos</a:t>
+            </a:r>
+          </a:p>
+          <a:p>
+            <a:pPr lvl="1"/>
+            <a:r>
+              <a:rPr lang="es-ES" dirty="0" smtClean="0"/>
+              <a:t>Una torreta con funcionalidad</a:t>
+            </a:r>
+          </a:p>
+          <a:p>
+            <a:pPr lvl="1"/>
+            <a:r>
+              <a:rPr lang="es-ES" dirty="0" smtClean="0"/>
+              <a:t>Enemigos que nos atacan: inteligentes</a:t>
+            </a:r>
+          </a:p>
+          <a:p>
+            <a:pPr lvl="1"/>
+            <a:r>
+              <a:rPr lang="es-ES" dirty="0" smtClean="0"/>
+              <a:t>Habilidades para curarnos y atacar</a:t>
+            </a:r>
+          </a:p>
+          <a:p>
+            <a:pPr lvl="1"/>
+            <a:r>
+              <a:rPr lang="es-ES" dirty="0" smtClean="0"/>
+              <a:t>Editor de mapas terminado</a:t>
+            </a:r>
+          </a:p>
+          <a:p>
+            <a:pPr lvl="1"/>
+            <a:r>
+              <a:rPr lang="es-ES" dirty="0" smtClean="0"/>
+              <a:t>Extras:</a:t>
+            </a:r>
+          </a:p>
+          <a:p>
+            <a:pPr lvl="2"/>
+            <a:r>
+              <a:rPr lang="es-ES" dirty="0" smtClean="0"/>
+              <a:t>Pintado de la física</a:t>
+            </a:r>
+          </a:p>
+          <a:p>
+            <a:pPr lvl="2"/>
+            <a:r>
+              <a:rPr lang="es-ES" dirty="0" smtClean="0"/>
+              <a:t>Integración de </a:t>
             </a:r>
             <a:r>
               <a:rPr lang="es-ES" dirty="0" err="1" smtClean="0"/>
-              <a:t>Habemus</a:t>
-            </a:r>
-            <a:r>
-              <a:rPr lang="es-ES" dirty="0" smtClean="0"/>
-              <a:t> artistas!</a:t>
-            </a:r>
-          </a:p>
-          <a:p>
-            <a:pPr lvl="1"/>
-            <a:r>
-              <a:rPr lang="es-ES" dirty="0" smtClean="0"/>
-              <a:t>En proceso:</a:t>
-            </a:r>
+              <a:t>lua</a:t>
+            </a:r>
+            <a:endParaRPr lang="es-ES" dirty="0" smtClean="0"/>
           </a:p>
           <a:p>
             <a:pPr lvl="2"/>
             <a:r>
-              <a:rPr lang="es-ES" dirty="0" smtClean="0"/>
-              <a:t>Modelo de Jack, el marine</a:t>
-            </a:r>
-          </a:p>
-          <a:p>
-            <a:pPr lvl="2"/>
-            <a:r>
-              <a:rPr lang="es-ES" dirty="0" smtClean="0"/>
-              <a:t>Modelo del vampiro básico</a:t>
-            </a:r>
-          </a:p>
-          <a:p>
-            <a:pPr lvl="2"/>
-            <a:r>
-              <a:rPr lang="es-ES" dirty="0" smtClean="0"/>
-              <a:t>Modelos de edificios</a:t>
+              <a:rPr lang="es-ES" dirty="0" err="1" smtClean="0"/>
+              <a:t>Parseador</a:t>
+            </a:r>
+            <a:r>
+              <a:rPr lang="es-ES" dirty="0" smtClean="0"/>
+              <a:t> de mapas en </a:t>
+            </a:r>
+            <a:r>
+              <a:rPr lang="es-ES" dirty="0" err="1" smtClean="0"/>
+              <a:t>lua</a:t>
             </a:r>
             <a:endParaRPr lang="es-ES" dirty="0"/>
           </a:p>
@@ -2901,7 +2886,7 @@
     </p:spTree>
     <p:extLst>
       <p:ext uri="{BB962C8B-B14F-4D97-AF65-F5344CB8AC3E}">
-        <p14:creationId xmlns:p14="http://schemas.microsoft.com/office/powerpoint/2010/main" val="462282373"/>
+        <p14:creationId xmlns:p14="http://schemas.microsoft.com/office/powerpoint/2010/main" xmlns="" val="3830420791"/>
       </p:ext>
     </p:extLst>
   </p:cSld>
@@ -3001,76 +2986,44 @@
           <a:p>
             <a:r>
               <a:rPr lang="es-ES" dirty="0" smtClean="0"/>
-              <a:t>Muestras</a:t>
-            </a:r>
-            <a:endParaRPr lang="es-ES" dirty="0"/>
-          </a:p>
-        </p:txBody>
-      </p:sp>
-      <p:pic>
-        <p:nvPicPr>
-          <p:cNvPr id="9" name="8 Imagen"/>
-          <p:cNvPicPr>
-            <a:picLocks noChangeAspect="1"/>
-          </p:cNvPicPr>
-          <p:nvPr/>
-        </p:nvPicPr>
-        <p:blipFill>
-          <a:blip r:embed="rId2">
-            <a:extLst>
-              <a:ext uri="{28A0092B-C50C-407E-A947-70E740481C1C}">
-                <a14:useLocalDpi xmlns:a14="http://schemas.microsoft.com/office/drawing/2010/main" val="0"/>
-              </a:ext>
-            </a:extLst>
-          </a:blip>
-          <a:stretch>
-            <a:fillRect/>
-          </a:stretch>
-        </p:blipFill>
-        <p:spPr>
-          <a:xfrm>
-            <a:off x="4335362" y="1983135"/>
-            <a:ext cx="4248133" cy="3186100"/>
-          </a:xfrm>
-          <a:prstGeom prst="rect">
-            <a:avLst/>
-          </a:prstGeom>
-        </p:spPr>
-      </p:pic>
-      <p:pic>
-        <p:nvPicPr>
-          <p:cNvPr id="11" name="10 Imagen"/>
-          <p:cNvPicPr>
-            <a:picLocks noChangeAspect="1"/>
-          </p:cNvPicPr>
-          <p:nvPr/>
-        </p:nvPicPr>
-        <p:blipFill>
-          <a:blip r:embed="rId3">
-            <a:extLst>
-              <a:ext uri="{28A0092B-C50C-407E-A947-70E740481C1C}">
-                <a14:useLocalDpi xmlns:a14="http://schemas.microsoft.com/office/drawing/2010/main" val="0"/>
-              </a:ext>
-            </a:extLst>
-          </a:blip>
-          <a:stretch>
-            <a:fillRect/>
-          </a:stretch>
-        </p:blipFill>
-        <p:spPr>
-          <a:xfrm>
-            <a:off x="840518" y="2081447"/>
-            <a:ext cx="4117050" cy="3087788"/>
-          </a:xfrm>
-          <a:prstGeom prst="rect">
-            <a:avLst/>
-          </a:prstGeom>
-        </p:spPr>
-      </p:pic>
+              <a:t>Conclusión</a:t>
+            </a:r>
+          </a:p>
+          <a:p>
+            <a:pPr lvl="1"/>
+            <a:r>
+              <a:rPr lang="es-ES" dirty="0" smtClean="0"/>
+              <a:t>Buen ritmo de trabajo, al igual que en el hito 1</a:t>
+            </a:r>
+          </a:p>
+          <a:p>
+            <a:pPr lvl="1"/>
+            <a:r>
+              <a:rPr lang="es-ES" dirty="0" smtClean="0"/>
+              <a:t>Mas arquitectura que funcionalidad</a:t>
+            </a:r>
+          </a:p>
+          <a:p>
+            <a:pPr lvl="1"/>
+            <a:r>
+              <a:rPr lang="es-ES" dirty="0" smtClean="0"/>
+              <a:t>Por tanto menos resultado visual</a:t>
+            </a:r>
+          </a:p>
+          <a:p>
+            <a:pPr lvl="1"/>
+            <a:r>
+              <a:rPr lang="es-ES" dirty="0" smtClean="0"/>
+              <a:t>Pero…</a:t>
+            </a:r>
+            <a:endParaRPr lang="es-ES" dirty="0"/>
+          </a:p>
+        </p:txBody>
+      </p:sp>
     </p:spTree>
     <p:extLst>
       <p:ext uri="{BB962C8B-B14F-4D97-AF65-F5344CB8AC3E}">
-        <p14:creationId xmlns:p14="http://schemas.microsoft.com/office/powerpoint/2010/main" val="3383840176"/>
+        <p14:creationId xmlns:p14="http://schemas.microsoft.com/office/powerpoint/2010/main" xmlns="" val="3976005005"/>
       </p:ext>
     </p:extLst>
   </p:cSld>
@@ -3170,46 +3123,52 @@
           <a:p>
             <a:r>
               <a:rPr lang="es-ES" dirty="0" smtClean="0"/>
-              <a:t>Muestras</a:t>
-            </a:r>
-            <a:endParaRPr lang="es-ES" dirty="0"/>
-          </a:p>
-        </p:txBody>
-      </p:sp>
-      <p:pic>
-        <p:nvPicPr>
-          <p:cNvPr id="5" name="4 Imagen"/>
-          <p:cNvPicPr>
-            <a:picLocks noChangeAspect="1"/>
-          </p:cNvPicPr>
-          <p:nvPr/>
-        </p:nvPicPr>
-        <p:blipFill>
-          <a:blip r:embed="rId2">
-            <a:extLst>
-              <a:ext uri="{28A0092B-C50C-407E-A947-70E740481C1C}">
-                <a14:useLocalDpi xmlns:a14="http://schemas.microsoft.com/office/drawing/2010/main" val="0"/>
-              </a:ext>
-            </a:extLst>
-          </a:blip>
-          <a:stretch>
-            <a:fillRect/>
-          </a:stretch>
-        </p:blipFill>
-        <p:spPr>
-          <a:xfrm>
-            <a:off x="2987824" y="1635070"/>
-            <a:ext cx="3133874" cy="4170194"/>
-          </a:xfrm>
-          <a:prstGeom prst="rect">
-            <a:avLst/>
-          </a:prstGeom>
-        </p:spPr>
-      </p:pic>
+              <a:t>¡</a:t>
+            </a:r>
+            <a:r>
+              <a:rPr lang="es-ES" dirty="0" err="1" smtClean="0"/>
+              <a:t>Habemus</a:t>
+            </a:r>
+            <a:r>
+              <a:rPr lang="es-ES" dirty="0" smtClean="0"/>
+              <a:t> artistas!</a:t>
+            </a:r>
+          </a:p>
+          <a:p>
+            <a:pPr lvl="1"/>
+            <a:r>
+              <a:rPr lang="es-ES" dirty="0" smtClean="0"/>
+              <a:t>En proceso:</a:t>
+            </a:r>
+          </a:p>
+          <a:p>
+            <a:pPr lvl="2"/>
+            <a:r>
+              <a:rPr lang="es-ES" dirty="0" smtClean="0"/>
+              <a:t>Modelo de Jack, el marine</a:t>
+            </a:r>
+          </a:p>
+          <a:p>
+            <a:pPr lvl="2"/>
+            <a:r>
+              <a:rPr lang="es-ES" dirty="0" smtClean="0"/>
+              <a:t>Modelo del vampiro básico</a:t>
+            </a:r>
+          </a:p>
+          <a:p>
+            <a:pPr lvl="2"/>
+            <a:r>
+              <a:rPr lang="es-ES" dirty="0" smtClean="0"/>
+              <a:t>Modelos de edificios</a:t>
+            </a:r>
+            <a:endParaRPr lang="es-ES" dirty="0"/>
+          </a:p>
+        </p:txBody>
+      </p:sp>
     </p:spTree>
     <p:extLst>
       <p:ext uri="{BB962C8B-B14F-4D97-AF65-F5344CB8AC3E}">
-        <p14:creationId xmlns:p14="http://schemas.microsoft.com/office/powerpoint/2010/main" val="756563718"/>
+        <p14:creationId xmlns:p14="http://schemas.microsoft.com/office/powerpoint/2010/main" xmlns="" val="462282373"/>
       </p:ext>
     </p:extLst>
   </p:cSld>
@@ -3317,7 +3276,7 @@
       </p:sp>
       <p:pic>
         <p:nvPicPr>
-          <p:cNvPr id="5" name="4 Imagen"/>
+          <p:cNvPr id="9" name="8 Imagen"/>
           <p:cNvPicPr>
             <a:picLocks noChangeAspect="1"/>
           </p:cNvPicPr>
@@ -3327,7 +3286,7 @@
           <a:blip r:embed="rId2" cstate="print">
             <a:extLst>
               <a:ext uri="{28A0092B-C50C-407E-A947-70E740481C1C}">
-                <a14:useLocalDpi xmlns:a14="http://schemas.microsoft.com/office/drawing/2010/main" val="0"/>
+                <a14:useLocalDpi xmlns:a14="http://schemas.microsoft.com/office/drawing/2010/main" xmlns="" val="0"/>
               </a:ext>
             </a:extLst>
           </a:blip>
@@ -3337,8 +3296,8 @@
         </p:blipFill>
         <p:spPr>
           <a:xfrm>
-            <a:off x="3504741" y="1735143"/>
-            <a:ext cx="2267744" cy="1603557"/>
+            <a:off x="4335362" y="1983135"/>
+            <a:ext cx="4248133" cy="3186100"/>
           </a:xfrm>
           <a:prstGeom prst="rect">
             <a:avLst/>
@@ -3347,7 +3306,7 @@
       </p:pic>
       <p:pic>
         <p:nvPicPr>
-          <p:cNvPr id="6" name="5 Imagen"/>
+          <p:cNvPr id="11" name="10 Imagen"/>
           <p:cNvPicPr>
             <a:picLocks noChangeAspect="1"/>
           </p:cNvPicPr>
@@ -3357,7 +3316,7 @@
           <a:blip r:embed="rId3" cstate="print">
             <a:extLst>
               <a:ext uri="{28A0092B-C50C-407E-A947-70E740481C1C}">
-                <a14:useLocalDpi xmlns:a14="http://schemas.microsoft.com/office/drawing/2010/main" val="0"/>
+                <a14:useLocalDpi xmlns:a14="http://schemas.microsoft.com/office/drawing/2010/main" xmlns="" val="0"/>
               </a:ext>
             </a:extLst>
           </a:blip>
@@ -3367,38 +3326,8 @@
         </p:blipFill>
         <p:spPr>
           <a:xfrm>
-            <a:off x="251520" y="3356992"/>
-            <a:ext cx="4211960" cy="2285866"/>
-          </a:xfrm>
-          <a:prstGeom prst="rect">
-            <a:avLst/>
-          </a:prstGeom>
-        </p:spPr>
-      </p:pic>
-      <p:pic>
-        <p:nvPicPr>
-          <p:cNvPr id="7" name="6 Imagen"/>
-          <p:cNvPicPr>
-            <a:picLocks noChangeAspect="1"/>
-          </p:cNvPicPr>
-          <p:nvPr/>
-        </p:nvPicPr>
-        <p:blipFill>
-          <a:blip r:embed="rId4" cstate="print">
-            <a:extLst>
-              <a:ext uri="{28A0092B-C50C-407E-A947-70E740481C1C}">
-                <a14:useLocalDpi xmlns:a14="http://schemas.microsoft.com/office/drawing/2010/main" val="0"/>
-              </a:ext>
-            </a:extLst>
-          </a:blip>
-          <a:stretch>
-            <a:fillRect/>
-          </a:stretch>
-        </p:blipFill>
-        <p:spPr>
-          <a:xfrm>
-            <a:off x="4638613" y="3356993"/>
-            <a:ext cx="4220060" cy="2285866"/>
+            <a:off x="840518" y="2081447"/>
+            <a:ext cx="4117050" cy="3087788"/>
           </a:xfrm>
           <a:prstGeom prst="rect">
             <a:avLst/>
@@ -3408,7 +3337,7 @@
     </p:spTree>
     <p:extLst>
       <p:ext uri="{BB962C8B-B14F-4D97-AF65-F5344CB8AC3E}">
-        <p14:creationId xmlns:p14="http://schemas.microsoft.com/office/powerpoint/2010/main" val="3171187498"/>
+        <p14:creationId xmlns:p14="http://schemas.microsoft.com/office/powerpoint/2010/main" xmlns="" val="3383840176"/>
       </p:ext>
     </p:extLst>
   </p:cSld>
@@ -3461,7 +3390,7 @@
           <a:p>
             <a:r>
               <a:rPr lang="es-ES" dirty="0" smtClean="0"/>
-              <a:t>4. Preguntas</a:t>
+              <a:t>3. Valoración final</a:t>
             </a:r>
             <a:endParaRPr lang="es-ES" dirty="0"/>
           </a:p>
@@ -3486,6 +3415,344 @@
               <a:rPr lang="es-ES" smtClean="0"/>
               <a:pPr/>
               <a:t>15</a:t>
+            </a:fld>
+            <a:endParaRPr lang="es-ES" dirty="0"/>
+          </a:p>
+        </p:txBody>
+      </p:sp>
+      <p:sp>
+        <p:nvSpPr>
+          <p:cNvPr id="4" name="3 Marcador de contenido"/>
+          <p:cNvSpPr>
+            <a:spLocks noGrp="1"/>
+          </p:cNvSpPr>
+          <p:nvPr>
+            <p:ph idx="1"/>
+          </p:nvPr>
+        </p:nvSpPr>
+        <p:spPr/>
+        <p:txBody>
+          <a:bodyPr/>
+          <a:lstStyle/>
+          <a:p>
+            <a:r>
+              <a:rPr lang="es-ES" dirty="0" smtClean="0"/>
+              <a:t>Muestras</a:t>
+            </a:r>
+            <a:endParaRPr lang="es-ES" dirty="0"/>
+          </a:p>
+        </p:txBody>
+      </p:sp>
+      <p:pic>
+        <p:nvPicPr>
+          <p:cNvPr id="5" name="4 Imagen"/>
+          <p:cNvPicPr>
+            <a:picLocks noChangeAspect="1"/>
+          </p:cNvPicPr>
+          <p:nvPr/>
+        </p:nvPicPr>
+        <p:blipFill>
+          <a:blip r:embed="rId2" cstate="print">
+            <a:extLst>
+              <a:ext uri="{28A0092B-C50C-407E-A947-70E740481C1C}">
+                <a14:useLocalDpi xmlns:a14="http://schemas.microsoft.com/office/drawing/2010/main" xmlns="" val="0"/>
+              </a:ext>
+            </a:extLst>
+          </a:blip>
+          <a:stretch>
+            <a:fillRect/>
+          </a:stretch>
+        </p:blipFill>
+        <p:spPr>
+          <a:xfrm>
+            <a:off x="2987824" y="1635070"/>
+            <a:ext cx="3133874" cy="4170194"/>
+          </a:xfrm>
+          <a:prstGeom prst="rect">
+            <a:avLst/>
+          </a:prstGeom>
+        </p:spPr>
+      </p:pic>
+    </p:spTree>
+    <p:extLst>
+      <p:ext uri="{BB962C8B-B14F-4D97-AF65-F5344CB8AC3E}">
+        <p14:creationId xmlns:p14="http://schemas.microsoft.com/office/powerpoint/2010/main" xmlns="" val="756563718"/>
+      </p:ext>
+    </p:extLst>
+  </p:cSld>
+  <p:clrMapOvr>
+    <a:masterClrMapping/>
+  </p:clrMapOvr>
+  <p:timing>
+    <p:tnLst>
+      <p:par>
+        <p:cTn id="1" dur="indefinite" restart="never" nodeType="tmRoot"/>
+      </p:par>
+    </p:tnLst>
+  </p:timing>
+</p:sld>
+</file>
+
+<file path=ppt/slides/slide17.xml><?xml version="1.0" encoding="utf-8"?>
+<p:sld xmlns:a="http://schemas.openxmlformats.org/drawingml/2006/main" xmlns:r="http://schemas.openxmlformats.org/officeDocument/2006/relationships" xmlns:p="http://schemas.openxmlformats.org/presentationml/2006/main">
+  <p:cSld>
+    <p:spTree>
+      <p:nvGrpSpPr>
+        <p:cNvPr id="1" name=""/>
+        <p:cNvGrpSpPr/>
+        <p:nvPr/>
+      </p:nvGrpSpPr>
+      <p:grpSpPr>
+        <a:xfrm>
+          <a:off x="0" y="0"/>
+          <a:ext cx="0" cy="0"/>
+          <a:chOff x="0" y="0"/>
+          <a:chExt cx="0" cy="0"/>
+        </a:xfrm>
+      </p:grpSpPr>
+      <p:sp>
+        <p:nvSpPr>
+          <p:cNvPr id="2" name="1 Título"/>
+          <p:cNvSpPr>
+            <a:spLocks noGrp="1"/>
+          </p:cNvSpPr>
+          <p:nvPr>
+            <p:ph type="title"/>
+          </p:nvPr>
+        </p:nvSpPr>
+        <p:spPr/>
+        <p:txBody>
+          <a:bodyPr>
+            <a:normAutofit fontScale="90000"/>
+          </a:bodyPr>
+          <a:lstStyle/>
+          <a:p>
+            <a:r>
+              <a:rPr lang="es-ES" dirty="0" smtClean="0"/>
+              <a:t>3. Valoración final</a:t>
+            </a:r>
+            <a:endParaRPr lang="es-ES" dirty="0"/>
+          </a:p>
+        </p:txBody>
+      </p:sp>
+      <p:sp>
+        <p:nvSpPr>
+          <p:cNvPr id="3" name="2 Marcador de número de diapositiva"/>
+          <p:cNvSpPr>
+            <a:spLocks noGrp="1"/>
+          </p:cNvSpPr>
+          <p:nvPr>
+            <p:ph type="sldNum" sz="quarter" idx="10"/>
+          </p:nvPr>
+        </p:nvSpPr>
+        <p:spPr/>
+        <p:txBody>
+          <a:bodyPr/>
+          <a:lstStyle/>
+          <a:p>
+            <a:fld id="{95CB376A-28C7-43B8-86A8-A747AD281D25}" type="slidenum">
+              <a:rPr lang="es-ES" smtClean="0"/>
+              <a:pPr/>
+              <a:t>16</a:t>
+            </a:fld>
+            <a:endParaRPr lang="es-ES" dirty="0"/>
+          </a:p>
+        </p:txBody>
+      </p:sp>
+      <p:sp>
+        <p:nvSpPr>
+          <p:cNvPr id="4" name="3 Marcador de contenido"/>
+          <p:cNvSpPr>
+            <a:spLocks noGrp="1"/>
+          </p:cNvSpPr>
+          <p:nvPr>
+            <p:ph idx="1"/>
+          </p:nvPr>
+        </p:nvSpPr>
+        <p:spPr/>
+        <p:txBody>
+          <a:bodyPr/>
+          <a:lstStyle/>
+          <a:p>
+            <a:r>
+              <a:rPr lang="es-ES" dirty="0" smtClean="0"/>
+              <a:t>Muestras</a:t>
+            </a:r>
+            <a:endParaRPr lang="es-ES" dirty="0"/>
+          </a:p>
+        </p:txBody>
+      </p:sp>
+      <p:pic>
+        <p:nvPicPr>
+          <p:cNvPr id="5" name="4 Imagen"/>
+          <p:cNvPicPr>
+            <a:picLocks noChangeAspect="1"/>
+          </p:cNvPicPr>
+          <p:nvPr/>
+        </p:nvPicPr>
+        <p:blipFill>
+          <a:blip r:embed="rId2" cstate="print">
+            <a:extLst>
+              <a:ext uri="{28A0092B-C50C-407E-A947-70E740481C1C}">
+                <a14:useLocalDpi xmlns:a14="http://schemas.microsoft.com/office/drawing/2010/main" xmlns="" val="0"/>
+              </a:ext>
+            </a:extLst>
+          </a:blip>
+          <a:stretch>
+            <a:fillRect/>
+          </a:stretch>
+        </p:blipFill>
+        <p:spPr>
+          <a:xfrm>
+            <a:off x="3504741" y="1735143"/>
+            <a:ext cx="2267744" cy="1603557"/>
+          </a:xfrm>
+          <a:prstGeom prst="rect">
+            <a:avLst/>
+          </a:prstGeom>
+        </p:spPr>
+      </p:pic>
+      <p:pic>
+        <p:nvPicPr>
+          <p:cNvPr id="6" name="5 Imagen"/>
+          <p:cNvPicPr>
+            <a:picLocks noChangeAspect="1"/>
+          </p:cNvPicPr>
+          <p:nvPr/>
+        </p:nvPicPr>
+        <p:blipFill>
+          <a:blip r:embed="rId3" cstate="print">
+            <a:extLst>
+              <a:ext uri="{28A0092B-C50C-407E-A947-70E740481C1C}">
+                <a14:useLocalDpi xmlns:a14="http://schemas.microsoft.com/office/drawing/2010/main" xmlns="" val="0"/>
+              </a:ext>
+            </a:extLst>
+          </a:blip>
+          <a:stretch>
+            <a:fillRect/>
+          </a:stretch>
+        </p:blipFill>
+        <p:spPr>
+          <a:xfrm>
+            <a:off x="251520" y="3356992"/>
+            <a:ext cx="4211960" cy="2285866"/>
+          </a:xfrm>
+          <a:prstGeom prst="rect">
+            <a:avLst/>
+          </a:prstGeom>
+        </p:spPr>
+      </p:pic>
+      <p:pic>
+        <p:nvPicPr>
+          <p:cNvPr id="7" name="6 Imagen"/>
+          <p:cNvPicPr>
+            <a:picLocks noChangeAspect="1"/>
+          </p:cNvPicPr>
+          <p:nvPr/>
+        </p:nvPicPr>
+        <p:blipFill>
+          <a:blip r:embed="rId4" cstate="print">
+            <a:extLst>
+              <a:ext uri="{28A0092B-C50C-407E-A947-70E740481C1C}">
+                <a14:useLocalDpi xmlns:a14="http://schemas.microsoft.com/office/drawing/2010/main" xmlns="" val="0"/>
+              </a:ext>
+            </a:extLst>
+          </a:blip>
+          <a:stretch>
+            <a:fillRect/>
+          </a:stretch>
+        </p:blipFill>
+        <p:spPr>
+          <a:xfrm>
+            <a:off x="4638613" y="3356993"/>
+            <a:ext cx="4220060" cy="2285866"/>
+          </a:xfrm>
+          <a:prstGeom prst="rect">
+            <a:avLst/>
+          </a:prstGeom>
+        </p:spPr>
+      </p:pic>
+    </p:spTree>
+    <p:extLst>
+      <p:ext uri="{BB962C8B-B14F-4D97-AF65-F5344CB8AC3E}">
+        <p14:creationId xmlns:p14="http://schemas.microsoft.com/office/powerpoint/2010/main" xmlns="" val="3171187498"/>
+      </p:ext>
+    </p:extLst>
+  </p:cSld>
+  <p:clrMapOvr>
+    <a:masterClrMapping/>
+  </p:clrMapOvr>
+  <p:timing>
+    <p:tnLst>
+      <p:par>
+        <p:cTn id="1" dur="indefinite" restart="never" nodeType="tmRoot"/>
+      </p:par>
+    </p:tnLst>
+  </p:timing>
+</p:sld>
+</file>
+
+<file path=ppt/slides/slide18.xml><?xml version="1.0" encoding="utf-8"?>
+<p:sld xmlns:a="http://schemas.openxmlformats.org/drawingml/2006/main" xmlns:r="http://schemas.openxmlformats.org/officeDocument/2006/relationships" xmlns:p="http://schemas.openxmlformats.org/presentationml/2006/main">
+  <p:cSld>
+    <p:spTree>
+      <p:nvGrpSpPr>
+        <p:cNvPr id="1" name=""/>
+        <p:cNvGrpSpPr/>
+        <p:nvPr/>
+      </p:nvGrpSpPr>
+      <p:grpSpPr>
+        <a:xfrm>
+          <a:off x="0" y="0"/>
+          <a:ext cx="0" cy="0"/>
+          <a:chOff x="0" y="0"/>
+          <a:chExt cx="0" cy="0"/>
+        </a:xfrm>
+      </p:grpSpPr>
+      <p:sp>
+        <p:nvSpPr>
+          <p:cNvPr id="2" name="1 Título"/>
+          <p:cNvSpPr>
+            <a:spLocks noGrp="1"/>
+          </p:cNvSpPr>
+          <p:nvPr>
+            <p:ph type="title"/>
+          </p:nvPr>
+        </p:nvSpPr>
+        <p:spPr/>
+        <p:txBody>
+          <a:bodyPr>
+            <a:normAutofit fontScale="90000"/>
+          </a:bodyPr>
+          <a:lstStyle/>
+          <a:p>
+            <a:r>
+              <a:rPr lang="es-ES" dirty="0" smtClean="0"/>
+              <a:t>4. Preguntas</a:t>
+            </a:r>
+            <a:endParaRPr lang="es-ES" dirty="0"/>
+          </a:p>
+        </p:txBody>
+      </p:sp>
+      <p:sp>
+        <p:nvSpPr>
+          <p:cNvPr id="3" name="2 Marcador de número de diapositiva"/>
+          <p:cNvSpPr>
+            <a:spLocks noGrp="1"/>
+          </p:cNvSpPr>
+          <p:nvPr>
+            <p:ph type="sldNum" sz="quarter" idx="10"/>
+          </p:nvPr>
+        </p:nvSpPr>
+        <p:spPr/>
+        <p:txBody>
+          <a:bodyPr/>
+          <a:lstStyle/>
+          <a:p>
+            <a:fld id="{95CB376A-28C7-43B8-86A8-A747AD281D25}" type="slidenum">
+              <a:rPr lang="es-ES" smtClean="0"/>
+              <a:pPr/>
+              <a:t>17</a:t>
             </a:fld>
             <a:endParaRPr lang="es-ES" dirty="0"/>
           </a:p>
@@ -3502,10 +3769,10 @@
           </p:nvPr>
         </p:nvPicPr>
         <p:blipFill>
-          <a:blip r:embed="rId2">
+          <a:blip r:embed="rId2" cstate="print">
             <a:extLst>
               <a:ext uri="{28A0092B-C50C-407E-A947-70E740481C1C}">
-                <a14:useLocalDpi xmlns:a14="http://schemas.microsoft.com/office/drawing/2010/main" val="0"/>
+                <a14:useLocalDpi xmlns:a14="http://schemas.microsoft.com/office/drawing/2010/main" xmlns="" val="0"/>
               </a:ext>
             </a:extLst>
           </a:blip>
@@ -3523,7 +3790,7 @@
     </p:spTree>
     <p:extLst>
       <p:ext uri="{BB962C8B-B14F-4D97-AF65-F5344CB8AC3E}">
-        <p14:creationId xmlns:p14="http://schemas.microsoft.com/office/powerpoint/2010/main" val="3085704438"/>
+        <p14:creationId xmlns:p14="http://schemas.microsoft.com/office/powerpoint/2010/main" xmlns="" val="3085704438"/>
       </p:ext>
     </p:extLst>
   </p:cSld>
@@ -3680,7 +3947,7 @@
     </p:spTree>
     <p:extLst>
       <p:ext uri="{BB962C8B-B14F-4D97-AF65-F5344CB8AC3E}">
-        <p14:creationId xmlns:p14="http://schemas.microsoft.com/office/powerpoint/2010/main" val="1496572999"/>
+        <p14:creationId xmlns:p14="http://schemas.microsoft.com/office/powerpoint/2010/main" xmlns="" val="1496572999"/>
       </p:ext>
     </p:extLst>
   </p:cSld>
@@ -3831,7 +4098,7 @@
     </p:spTree>
     <p:extLst>
       <p:ext uri="{BB962C8B-B14F-4D97-AF65-F5344CB8AC3E}">
-        <p14:creationId xmlns:p14="http://schemas.microsoft.com/office/powerpoint/2010/main" val="4278571466"/>
+        <p14:creationId xmlns:p14="http://schemas.microsoft.com/office/powerpoint/2010/main" xmlns="" val="4278571466"/>
       </p:ext>
     </p:extLst>
   </p:cSld>
@@ -3957,11 +4224,7 @@
           <a:p>
             <a:r>
               <a:rPr lang="es-ES_tradnl" dirty="0" smtClean="0"/>
-              <a:t>Ataque de las </a:t>
-            </a:r>
-            <a:r>
-              <a:rPr lang="es-ES_tradnl" dirty="0" smtClean="0"/>
-              <a:t>torretas</a:t>
+              <a:t>Ataque de las torretas</a:t>
             </a:r>
           </a:p>
           <a:p>
@@ -4003,7 +4266,7 @@
     </p:spTree>
     <p:extLst>
       <p:ext uri="{BB962C8B-B14F-4D97-AF65-F5344CB8AC3E}">
-        <p14:creationId xmlns:p14="http://schemas.microsoft.com/office/powerpoint/2010/main" val="355797707"/>
+        <p14:creationId xmlns:p14="http://schemas.microsoft.com/office/powerpoint/2010/main" xmlns="" val="355797707"/>
       </p:ext>
     </p:extLst>
   </p:cSld>
@@ -4112,7 +4375,7 @@
     </p:spTree>
     <p:extLst>
       <p:ext uri="{BB962C8B-B14F-4D97-AF65-F5344CB8AC3E}">
-        <p14:creationId xmlns:p14="http://schemas.microsoft.com/office/powerpoint/2010/main" val="2108186419"/>
+        <p14:creationId xmlns:p14="http://schemas.microsoft.com/office/powerpoint/2010/main" xmlns="" val="2108186419"/>
       </p:ext>
     </p:extLst>
   </p:cSld>
@@ -4221,7 +4484,7 @@
     </p:spTree>
     <p:extLst>
       <p:ext uri="{BB962C8B-B14F-4D97-AF65-F5344CB8AC3E}">
-        <p14:creationId xmlns:p14="http://schemas.microsoft.com/office/powerpoint/2010/main" val="4038242327"/>
+        <p14:creationId xmlns:p14="http://schemas.microsoft.com/office/powerpoint/2010/main" xmlns="" val="4038242327"/>
       </p:ext>
     </p:extLst>
   </p:cSld>
@@ -4330,7 +4593,7 @@
     </p:spTree>
     <p:extLst>
       <p:ext uri="{BB962C8B-B14F-4D97-AF65-F5344CB8AC3E}">
-        <p14:creationId xmlns:p14="http://schemas.microsoft.com/office/powerpoint/2010/main" val="2301363484"/>
+        <p14:creationId xmlns:p14="http://schemas.microsoft.com/office/powerpoint/2010/main" xmlns="" val="2301363484"/>
       </p:ext>
     </p:extLst>
   </p:cSld>
@@ -4487,7 +4750,7 @@
     </p:spTree>
     <p:extLst>
       <p:ext uri="{BB962C8B-B14F-4D97-AF65-F5344CB8AC3E}">
-        <p14:creationId xmlns:p14="http://schemas.microsoft.com/office/powerpoint/2010/main" val="3197139637"/>
+        <p14:creationId xmlns:p14="http://schemas.microsoft.com/office/powerpoint/2010/main" xmlns="" val="3197139637"/>
       </p:ext>
     </p:extLst>
   </p:cSld>
@@ -4596,7 +4859,7 @@
     </p:spTree>
     <p:extLst>
       <p:ext uri="{BB962C8B-B14F-4D97-AF65-F5344CB8AC3E}">
-        <p14:creationId xmlns:p14="http://schemas.microsoft.com/office/powerpoint/2010/main" val="1237790679"/>
+        <p14:creationId xmlns:p14="http://schemas.microsoft.com/office/powerpoint/2010/main" xmlns="" val="1237790679"/>
       </p:ext>
     </p:extLst>
   </p:cSld>

</xml_diff>